<commit_message>
add slide day 1
</commit_message>
<xml_diff>
--- a/Documents/Day1.pptx
+++ b/Documents/Day1.pptx
@@ -6,6 +6,23 @@
   </p:sldMasterIdLst>
   <p:sldIdLst>
     <p:sldId id="256" r:id="rId2"/>
+    <p:sldId id="257" r:id="rId3"/>
+    <p:sldId id="260" r:id="rId4"/>
+    <p:sldId id="261" r:id="rId5"/>
+    <p:sldId id="262" r:id="rId6"/>
+    <p:sldId id="258" r:id="rId7"/>
+    <p:sldId id="263" r:id="rId8"/>
+    <p:sldId id="259" r:id="rId9"/>
+    <p:sldId id="264" r:id="rId10"/>
+    <p:sldId id="267" r:id="rId11"/>
+    <p:sldId id="265" r:id="rId12"/>
+    <p:sldId id="266" r:id="rId13"/>
+    <p:sldId id="268" r:id="rId14"/>
+    <p:sldId id="273" r:id="rId15"/>
+    <p:sldId id="269" r:id="rId16"/>
+    <p:sldId id="270" r:id="rId17"/>
+    <p:sldId id="271" r:id="rId18"/>
+    <p:sldId id="272" r:id="rId19"/>
   </p:sldIdLst>
   <p:sldSz cx="12192000" cy="6858000"/>
   <p:notesSz cx="6858000" cy="9144000"/>
@@ -104,6 +121,11 @@
       </a:defRPr>
     </a:lvl9pPr>
   </p:defaultTextStyle>
+  <p:extLst>
+    <p:ext uri="{EFAFB233-063F-42B5-8137-9DF3F51BA10A}">
+      <p15:sldGuideLst xmlns:p15="http://schemas.microsoft.com/office/powerpoint/2012/main"/>
+    </p:ext>
+  </p:extLst>
 </p:presentation>
 </file>
 
@@ -270,7 +292,7 @@
           <a:p>
             <a:fld id="{11084B26-EC65-44AA-9914-32E9317931FB}" type="datetimeFigureOut">
               <a:rPr lang="en-US" smtClean="0"/>
-              <a:t>6/2/2019</a:t>
+              <a:t>6/5/2019</a:t>
             </a:fld>
             <a:endParaRPr lang="en-US"/>
           </a:p>
@@ -440,7 +462,7 @@
           <a:p>
             <a:fld id="{11084B26-EC65-44AA-9914-32E9317931FB}" type="datetimeFigureOut">
               <a:rPr lang="en-US" smtClean="0"/>
-              <a:t>6/2/2019</a:t>
+              <a:t>6/5/2019</a:t>
             </a:fld>
             <a:endParaRPr lang="en-US"/>
           </a:p>
@@ -620,7 +642,7 @@
           <a:p>
             <a:fld id="{11084B26-EC65-44AA-9914-32E9317931FB}" type="datetimeFigureOut">
               <a:rPr lang="en-US" smtClean="0"/>
-              <a:t>6/2/2019</a:t>
+              <a:t>6/5/2019</a:t>
             </a:fld>
             <a:endParaRPr lang="en-US"/>
           </a:p>
@@ -790,7 +812,7 @@
           <a:p>
             <a:fld id="{11084B26-EC65-44AA-9914-32E9317931FB}" type="datetimeFigureOut">
               <a:rPr lang="en-US" smtClean="0"/>
-              <a:t>6/2/2019</a:t>
+              <a:t>6/5/2019</a:t>
             </a:fld>
             <a:endParaRPr lang="en-US"/>
           </a:p>
@@ -1058,7 +1080,7 @@
           <a:p>
             <a:fld id="{11084B26-EC65-44AA-9914-32E9317931FB}" type="datetimeFigureOut">
               <a:rPr lang="en-US" smtClean="0"/>
-              <a:t>6/2/2019</a:t>
+              <a:t>6/5/2019</a:t>
             </a:fld>
             <a:endParaRPr lang="en-US"/>
           </a:p>
@@ -1290,7 +1312,7 @@
           <a:p>
             <a:fld id="{11084B26-EC65-44AA-9914-32E9317931FB}" type="datetimeFigureOut">
               <a:rPr lang="en-US" smtClean="0"/>
-              <a:t>6/2/2019</a:t>
+              <a:t>6/5/2019</a:t>
             </a:fld>
             <a:endParaRPr lang="en-US"/>
           </a:p>
@@ -1649,7 +1671,7 @@
           <a:p>
             <a:fld id="{11084B26-EC65-44AA-9914-32E9317931FB}" type="datetimeFigureOut">
               <a:rPr lang="en-US" smtClean="0"/>
-              <a:t>6/2/2019</a:t>
+              <a:t>6/5/2019</a:t>
             </a:fld>
             <a:endParaRPr lang="en-US"/>
           </a:p>
@@ -1790,7 +1812,7 @@
           <a:p>
             <a:fld id="{11084B26-EC65-44AA-9914-32E9317931FB}" type="datetimeFigureOut">
               <a:rPr lang="en-US" smtClean="0"/>
-              <a:t>6/2/2019</a:t>
+              <a:t>6/5/2019</a:t>
             </a:fld>
             <a:endParaRPr lang="en-US"/>
           </a:p>
@@ -1885,7 +1907,7 @@
           <a:p>
             <a:fld id="{11084B26-EC65-44AA-9914-32E9317931FB}" type="datetimeFigureOut">
               <a:rPr lang="en-US" smtClean="0"/>
-              <a:t>6/2/2019</a:t>
+              <a:t>6/5/2019</a:t>
             </a:fld>
             <a:endParaRPr lang="en-US"/>
           </a:p>
@@ -2242,7 +2264,7 @@
           <a:p>
             <a:fld id="{11084B26-EC65-44AA-9914-32E9317931FB}" type="datetimeFigureOut">
               <a:rPr lang="en-US" smtClean="0"/>
-              <a:t>6/2/2019</a:t>
+              <a:t>6/5/2019</a:t>
             </a:fld>
             <a:endParaRPr lang="en-US"/>
           </a:p>
@@ -2599,7 +2621,7 @@
           <a:p>
             <a:fld id="{11084B26-EC65-44AA-9914-32E9317931FB}" type="datetimeFigureOut">
               <a:rPr lang="en-US" smtClean="0"/>
-              <a:t>6/2/2019</a:t>
+              <a:t>6/5/2019</a:t>
             </a:fld>
             <a:endParaRPr lang="en-US"/>
           </a:p>
@@ -2840,7 +2862,7 @@
           <a:p>
             <a:fld id="{11084B26-EC65-44AA-9914-32E9317931FB}" type="datetimeFigureOut">
               <a:rPr lang="en-US" smtClean="0"/>
-              <a:t>6/2/2019</a:t>
+              <a:t>6/5/2019</a:t>
             </a:fld>
             <a:endParaRPr lang="en-US"/>
           </a:p>
@@ -3307,7 +3329,11 @@
           <a:bodyPr/>
           <a:lstStyle/>
           <a:p>
-            <a:endParaRPr lang="en-US"/>
+            <a:r>
+              <a:rPr lang="en-US" dirty="0" smtClean="0"/>
+              <a:t>DAY 01</a:t>
+            </a:r>
+            <a:endParaRPr lang="en-US" dirty="0"/>
           </a:p>
         </p:txBody>
       </p:sp>
@@ -3326,7 +3352,11 @@
           <a:bodyPr/>
           <a:lstStyle/>
           <a:p>
-            <a:endParaRPr lang="en-US"/>
+            <a:r>
+              <a:rPr lang="en-US" dirty="0" smtClean="0"/>
+              <a:t>C# BASIC</a:t>
+            </a:r>
+            <a:endParaRPr lang="en-US" dirty="0"/>
           </a:p>
         </p:txBody>
       </p:sp>
@@ -3340,6 +3370,1575 @@
   <p:clrMapOvr>
     <a:masterClrMapping/>
   </p:clrMapOvr>
+  <p:timing>
+    <p:tnLst>
+      <p:par>
+        <p:cTn id="1" dur="indefinite" restart="never" nodeType="tmRoot"/>
+      </p:par>
+    </p:tnLst>
+  </p:timing>
+</p:sld>
+</file>
+
+<file path=ppt/slides/slide10.xml><?xml version="1.0" encoding="utf-8"?>
+<p:sld xmlns:a="http://schemas.openxmlformats.org/drawingml/2006/main" xmlns:r="http://schemas.openxmlformats.org/officeDocument/2006/relationships" xmlns:p="http://schemas.openxmlformats.org/presentationml/2006/main">
+  <p:cSld>
+    <p:spTree>
+      <p:nvGrpSpPr>
+        <p:cNvPr id="1" name=""/>
+        <p:cNvGrpSpPr/>
+        <p:nvPr/>
+      </p:nvGrpSpPr>
+      <p:grpSpPr>
+        <a:xfrm>
+          <a:off x="0" y="0"/>
+          <a:ext cx="0" cy="0"/>
+          <a:chOff x="0" y="0"/>
+          <a:chExt cx="0" cy="0"/>
+        </a:xfrm>
+      </p:grpSpPr>
+      <p:sp>
+        <p:nvSpPr>
+          <p:cNvPr id="2" name="Title 1"/>
+          <p:cNvSpPr>
+            <a:spLocks noGrp="1"/>
+          </p:cNvSpPr>
+          <p:nvPr>
+            <p:ph type="ctrTitle"/>
+          </p:nvPr>
+        </p:nvSpPr>
+        <p:spPr/>
+        <p:txBody>
+          <a:bodyPr/>
+          <a:lstStyle/>
+          <a:p>
+            <a:r>
+              <a:rPr lang="en-US" dirty="0" smtClean="0"/>
+              <a:t>DECISION MAKING</a:t>
+            </a:r>
+            <a:endParaRPr lang="en-US" dirty="0"/>
+          </a:p>
+        </p:txBody>
+      </p:sp>
+      <p:sp>
+        <p:nvSpPr>
+          <p:cNvPr id="3" name="Subtitle 2"/>
+          <p:cNvSpPr>
+            <a:spLocks noGrp="1"/>
+          </p:cNvSpPr>
+          <p:nvPr>
+            <p:ph type="subTitle" idx="1"/>
+          </p:nvPr>
+        </p:nvSpPr>
+        <p:spPr/>
+        <p:txBody>
+          <a:bodyPr/>
+          <a:lstStyle/>
+          <a:p>
+            <a:r>
+              <a:rPr lang="en-US" dirty="0" smtClean="0"/>
+              <a:t>If-else</a:t>
+            </a:r>
+          </a:p>
+          <a:p>
+            <a:r>
+              <a:rPr lang="en-US" dirty="0" smtClean="0"/>
+              <a:t>Switch-case</a:t>
+            </a:r>
+            <a:endParaRPr lang="en-US" dirty="0"/>
+          </a:p>
+        </p:txBody>
+      </p:sp>
+    </p:spTree>
+    <p:extLst>
+      <p:ext uri="{BB962C8B-B14F-4D97-AF65-F5344CB8AC3E}">
+        <p14:creationId xmlns:p14="http://schemas.microsoft.com/office/powerpoint/2010/main" val="3275604488"/>
+      </p:ext>
+    </p:extLst>
+  </p:cSld>
+  <p:clrMapOvr>
+    <a:masterClrMapping/>
+  </p:clrMapOvr>
+  <p:timing>
+    <p:tnLst>
+      <p:par>
+        <p:cTn id="1" dur="indefinite" restart="never" nodeType="tmRoot"/>
+      </p:par>
+    </p:tnLst>
+  </p:timing>
+</p:sld>
+</file>
+
+<file path=ppt/slides/slide11.xml><?xml version="1.0" encoding="utf-8"?>
+<p:sld xmlns:a="http://schemas.openxmlformats.org/drawingml/2006/main" xmlns:r="http://schemas.openxmlformats.org/officeDocument/2006/relationships" xmlns:p="http://schemas.openxmlformats.org/presentationml/2006/main">
+  <p:cSld>
+    <p:spTree>
+      <p:nvGrpSpPr>
+        <p:cNvPr id="1" name=""/>
+        <p:cNvGrpSpPr/>
+        <p:nvPr/>
+      </p:nvGrpSpPr>
+      <p:grpSpPr>
+        <a:xfrm>
+          <a:off x="0" y="0"/>
+          <a:ext cx="0" cy="0"/>
+          <a:chOff x="0" y="0"/>
+          <a:chExt cx="0" cy="0"/>
+        </a:xfrm>
+      </p:grpSpPr>
+      <p:sp>
+        <p:nvSpPr>
+          <p:cNvPr id="2" name="Title 1"/>
+          <p:cNvSpPr>
+            <a:spLocks noGrp="1"/>
+          </p:cNvSpPr>
+          <p:nvPr>
+            <p:ph type="title"/>
+          </p:nvPr>
+        </p:nvSpPr>
+        <p:spPr/>
+        <p:txBody>
+          <a:bodyPr/>
+          <a:lstStyle/>
+          <a:p>
+            <a:r>
+              <a:rPr lang="en-US" dirty="0" smtClean="0"/>
+              <a:t>IF Condition</a:t>
+            </a:r>
+            <a:endParaRPr lang="en-US" dirty="0"/>
+          </a:p>
+        </p:txBody>
+      </p:sp>
+      <p:pic>
+        <p:nvPicPr>
+          <p:cNvPr id="4" name="Content Placeholder 3"/>
+          <p:cNvPicPr>
+            <a:picLocks noGrp="1" noChangeAspect="1"/>
+          </p:cNvPicPr>
+          <p:nvPr>
+            <p:ph idx="1"/>
+          </p:nvPr>
+        </p:nvPicPr>
+        <p:blipFill>
+          <a:blip r:embed="rId2">
+            <a:extLst>
+              <a:ext uri="{28A0092B-C50C-407E-A947-70E740481C1C}">
+                <a14:useLocalDpi xmlns:a14="http://schemas.microsoft.com/office/drawing/2010/main" val="0"/>
+              </a:ext>
+            </a:extLst>
+          </a:blip>
+          <a:stretch>
+            <a:fillRect/>
+          </a:stretch>
+        </p:blipFill>
+        <p:spPr>
+          <a:xfrm>
+            <a:off x="2231136" y="2546995"/>
+            <a:ext cx="3224463" cy="3847859"/>
+          </a:xfrm>
+        </p:spPr>
+      </p:pic>
+      <p:pic>
+        <p:nvPicPr>
+          <p:cNvPr id="10" name="Picture 9"/>
+          <p:cNvPicPr>
+            <a:picLocks noChangeAspect="1"/>
+          </p:cNvPicPr>
+          <p:nvPr/>
+        </p:nvPicPr>
+        <p:blipFill>
+          <a:blip r:embed="rId3"/>
+          <a:stretch>
+            <a:fillRect/>
+          </a:stretch>
+        </p:blipFill>
+        <p:spPr>
+          <a:xfrm>
+            <a:off x="5727033" y="2546995"/>
+            <a:ext cx="5559004" cy="3847859"/>
+          </a:xfrm>
+          <a:prstGeom prst="rect">
+            <a:avLst/>
+          </a:prstGeom>
+        </p:spPr>
+      </p:pic>
+    </p:spTree>
+    <p:extLst>
+      <p:ext uri="{BB962C8B-B14F-4D97-AF65-F5344CB8AC3E}">
+        <p14:creationId xmlns:p14="http://schemas.microsoft.com/office/powerpoint/2010/main" val="621714786"/>
+      </p:ext>
+    </p:extLst>
+  </p:cSld>
+  <p:clrMapOvr>
+    <a:masterClrMapping/>
+  </p:clrMapOvr>
+  <p:timing>
+    <p:tnLst>
+      <p:par>
+        <p:cTn id="1" dur="indefinite" restart="never" nodeType="tmRoot"/>
+      </p:par>
+    </p:tnLst>
+  </p:timing>
+</p:sld>
+</file>
+
+<file path=ppt/slides/slide12.xml><?xml version="1.0" encoding="utf-8"?>
+<p:sld xmlns:a="http://schemas.openxmlformats.org/drawingml/2006/main" xmlns:r="http://schemas.openxmlformats.org/officeDocument/2006/relationships" xmlns:p="http://schemas.openxmlformats.org/presentationml/2006/main">
+  <p:cSld>
+    <p:spTree>
+      <p:nvGrpSpPr>
+        <p:cNvPr id="1" name=""/>
+        <p:cNvGrpSpPr/>
+        <p:nvPr/>
+      </p:nvGrpSpPr>
+      <p:grpSpPr>
+        <a:xfrm>
+          <a:off x="0" y="0"/>
+          <a:ext cx="0" cy="0"/>
+          <a:chOff x="0" y="0"/>
+          <a:chExt cx="0" cy="0"/>
+        </a:xfrm>
+      </p:grpSpPr>
+      <p:sp>
+        <p:nvSpPr>
+          <p:cNvPr id="2" name="Title 1"/>
+          <p:cNvSpPr>
+            <a:spLocks noGrp="1"/>
+          </p:cNvSpPr>
+          <p:nvPr>
+            <p:ph type="title"/>
+          </p:nvPr>
+        </p:nvSpPr>
+        <p:spPr/>
+        <p:txBody>
+          <a:bodyPr/>
+          <a:lstStyle/>
+          <a:p>
+            <a:r>
+              <a:rPr lang="en-US" dirty="0" smtClean="0"/>
+              <a:t>SWITCH - CASE</a:t>
+            </a:r>
+            <a:endParaRPr lang="en-US" dirty="0"/>
+          </a:p>
+        </p:txBody>
+      </p:sp>
+      <p:pic>
+        <p:nvPicPr>
+          <p:cNvPr id="4" name="Content Placeholder 3"/>
+          <p:cNvPicPr>
+            <a:picLocks noGrp="1" noChangeAspect="1"/>
+          </p:cNvPicPr>
+          <p:nvPr>
+            <p:ph idx="1"/>
+          </p:nvPr>
+        </p:nvPicPr>
+        <p:blipFill>
+          <a:blip r:embed="rId2">
+            <a:extLst>
+              <a:ext uri="{28A0092B-C50C-407E-A947-70E740481C1C}">
+                <a14:useLocalDpi xmlns:a14="http://schemas.microsoft.com/office/drawing/2010/main" val="0"/>
+              </a:ext>
+            </a:extLst>
+          </a:blip>
+          <a:stretch>
+            <a:fillRect/>
+          </a:stretch>
+        </p:blipFill>
+        <p:spPr>
+          <a:xfrm>
+            <a:off x="2231136" y="2469983"/>
+            <a:ext cx="2774001" cy="3720102"/>
+          </a:xfrm>
+        </p:spPr>
+      </p:pic>
+      <p:pic>
+        <p:nvPicPr>
+          <p:cNvPr id="5" name="Picture 4"/>
+          <p:cNvPicPr>
+            <a:picLocks noChangeAspect="1"/>
+          </p:cNvPicPr>
+          <p:nvPr/>
+        </p:nvPicPr>
+        <p:blipFill>
+          <a:blip r:embed="rId3"/>
+          <a:stretch>
+            <a:fillRect/>
+          </a:stretch>
+        </p:blipFill>
+        <p:spPr>
+          <a:xfrm>
+            <a:off x="5522495" y="2469983"/>
+            <a:ext cx="4438369" cy="3721162"/>
+          </a:xfrm>
+          <a:prstGeom prst="rect">
+            <a:avLst/>
+          </a:prstGeom>
+        </p:spPr>
+      </p:pic>
+    </p:spTree>
+    <p:extLst>
+      <p:ext uri="{BB962C8B-B14F-4D97-AF65-F5344CB8AC3E}">
+        <p14:creationId xmlns:p14="http://schemas.microsoft.com/office/powerpoint/2010/main" val="1577418940"/>
+      </p:ext>
+    </p:extLst>
+  </p:cSld>
+  <p:clrMapOvr>
+    <a:masterClrMapping/>
+  </p:clrMapOvr>
+  <p:timing>
+    <p:tnLst>
+      <p:par>
+        <p:cTn id="1" dur="indefinite" restart="never" nodeType="tmRoot"/>
+      </p:par>
+    </p:tnLst>
+  </p:timing>
+</p:sld>
+</file>
+
+<file path=ppt/slides/slide13.xml><?xml version="1.0" encoding="utf-8"?>
+<p:sld xmlns:a="http://schemas.openxmlformats.org/drawingml/2006/main" xmlns:r="http://schemas.openxmlformats.org/officeDocument/2006/relationships" xmlns:p="http://schemas.openxmlformats.org/presentationml/2006/main">
+  <p:cSld>
+    <p:spTree>
+      <p:nvGrpSpPr>
+        <p:cNvPr id="1" name=""/>
+        <p:cNvGrpSpPr/>
+        <p:nvPr/>
+      </p:nvGrpSpPr>
+      <p:grpSpPr>
+        <a:xfrm>
+          <a:off x="0" y="0"/>
+          <a:ext cx="0" cy="0"/>
+          <a:chOff x="0" y="0"/>
+          <a:chExt cx="0" cy="0"/>
+        </a:xfrm>
+      </p:grpSpPr>
+      <p:sp>
+        <p:nvSpPr>
+          <p:cNvPr id="2" name="Title 1"/>
+          <p:cNvSpPr>
+            <a:spLocks noGrp="1"/>
+          </p:cNvSpPr>
+          <p:nvPr>
+            <p:ph type="ctrTitle"/>
+          </p:nvPr>
+        </p:nvSpPr>
+        <p:spPr/>
+        <p:txBody>
+          <a:bodyPr/>
+          <a:lstStyle/>
+          <a:p>
+            <a:r>
+              <a:rPr lang="en-US" dirty="0" smtClean="0"/>
+              <a:t>LOOPS</a:t>
+            </a:r>
+            <a:endParaRPr lang="en-US" dirty="0"/>
+          </a:p>
+        </p:txBody>
+      </p:sp>
+      <p:sp>
+        <p:nvSpPr>
+          <p:cNvPr id="3" name="Subtitle 2"/>
+          <p:cNvSpPr>
+            <a:spLocks noGrp="1"/>
+          </p:cNvSpPr>
+          <p:nvPr>
+            <p:ph type="subTitle" idx="1"/>
+          </p:nvPr>
+        </p:nvSpPr>
+        <p:spPr/>
+        <p:txBody>
+          <a:bodyPr>
+            <a:normAutofit lnSpcReduction="10000"/>
+          </a:bodyPr>
+          <a:lstStyle/>
+          <a:p>
+            <a:r>
+              <a:rPr lang="en-US" dirty="0" smtClean="0"/>
+              <a:t>for</a:t>
+            </a:r>
+          </a:p>
+          <a:p>
+            <a:r>
+              <a:rPr lang="en-US" dirty="0"/>
+              <a:t>w</a:t>
+            </a:r>
+            <a:r>
+              <a:rPr lang="en-US" dirty="0" smtClean="0"/>
+              <a:t>hile</a:t>
+            </a:r>
+          </a:p>
+          <a:p>
+            <a:r>
+              <a:rPr lang="en-US" dirty="0" smtClean="0"/>
+              <a:t>do-while</a:t>
+            </a:r>
+            <a:endParaRPr lang="en-US" dirty="0"/>
+          </a:p>
+        </p:txBody>
+      </p:sp>
+    </p:spTree>
+    <p:extLst>
+      <p:ext uri="{BB962C8B-B14F-4D97-AF65-F5344CB8AC3E}">
+        <p14:creationId xmlns:p14="http://schemas.microsoft.com/office/powerpoint/2010/main" val="4001331195"/>
+      </p:ext>
+    </p:extLst>
+  </p:cSld>
+  <p:clrMapOvr>
+    <a:masterClrMapping/>
+  </p:clrMapOvr>
+  <p:timing>
+    <p:tnLst>
+      <p:par>
+        <p:cTn id="1" dur="indefinite" restart="never" nodeType="tmRoot"/>
+      </p:par>
+    </p:tnLst>
+  </p:timing>
+</p:sld>
+</file>
+
+<file path=ppt/slides/slide14.xml><?xml version="1.0" encoding="utf-8"?>
+<p:sld xmlns:a="http://schemas.openxmlformats.org/drawingml/2006/main" xmlns:r="http://schemas.openxmlformats.org/officeDocument/2006/relationships" xmlns:p="http://schemas.openxmlformats.org/presentationml/2006/main">
+  <p:cSld>
+    <p:spTree>
+      <p:nvGrpSpPr>
+        <p:cNvPr id="1" name=""/>
+        <p:cNvGrpSpPr/>
+        <p:nvPr/>
+      </p:nvGrpSpPr>
+      <p:grpSpPr>
+        <a:xfrm>
+          <a:off x="0" y="0"/>
+          <a:ext cx="0" cy="0"/>
+          <a:chOff x="0" y="0"/>
+          <a:chExt cx="0" cy="0"/>
+        </a:xfrm>
+      </p:grpSpPr>
+      <p:sp>
+        <p:nvSpPr>
+          <p:cNvPr id="2" name="Title 1"/>
+          <p:cNvSpPr>
+            <a:spLocks noGrp="1"/>
+          </p:cNvSpPr>
+          <p:nvPr>
+            <p:ph type="title"/>
+          </p:nvPr>
+        </p:nvSpPr>
+        <p:spPr/>
+        <p:txBody>
+          <a:bodyPr/>
+          <a:lstStyle/>
+          <a:p>
+            <a:r>
+              <a:rPr lang="en-US" dirty="0" smtClean="0"/>
+              <a:t>LOOP</a:t>
+            </a:r>
+            <a:endParaRPr lang="en-US" dirty="0"/>
+          </a:p>
+        </p:txBody>
+      </p:sp>
+      <p:pic>
+        <p:nvPicPr>
+          <p:cNvPr id="4" name="Content Placeholder 3"/>
+          <p:cNvPicPr>
+            <a:picLocks noGrp="1" noChangeAspect="1"/>
+          </p:cNvPicPr>
+          <p:nvPr>
+            <p:ph idx="1"/>
+          </p:nvPr>
+        </p:nvPicPr>
+        <p:blipFill>
+          <a:blip r:embed="rId2">
+            <a:extLst>
+              <a:ext uri="{28A0092B-C50C-407E-A947-70E740481C1C}">
+                <a14:useLocalDpi xmlns:a14="http://schemas.microsoft.com/office/drawing/2010/main" val="0"/>
+              </a:ext>
+            </a:extLst>
+          </a:blip>
+          <a:stretch>
+            <a:fillRect/>
+          </a:stretch>
+        </p:blipFill>
+        <p:spPr>
+          <a:xfrm>
+            <a:off x="4481297" y="2373730"/>
+            <a:ext cx="3229406" cy="3816571"/>
+          </a:xfrm>
+        </p:spPr>
+      </p:pic>
+    </p:spTree>
+    <p:extLst>
+      <p:ext uri="{BB962C8B-B14F-4D97-AF65-F5344CB8AC3E}">
+        <p14:creationId xmlns:p14="http://schemas.microsoft.com/office/powerpoint/2010/main" val="1857093966"/>
+      </p:ext>
+    </p:extLst>
+  </p:cSld>
+  <p:clrMapOvr>
+    <a:masterClrMapping/>
+  </p:clrMapOvr>
+</p:sld>
+</file>
+
+<file path=ppt/slides/slide15.xml><?xml version="1.0" encoding="utf-8"?>
+<p:sld xmlns:a="http://schemas.openxmlformats.org/drawingml/2006/main" xmlns:r="http://schemas.openxmlformats.org/officeDocument/2006/relationships" xmlns:p="http://schemas.openxmlformats.org/presentationml/2006/main">
+  <p:cSld>
+    <p:spTree>
+      <p:nvGrpSpPr>
+        <p:cNvPr id="1" name=""/>
+        <p:cNvGrpSpPr/>
+        <p:nvPr/>
+      </p:nvGrpSpPr>
+      <p:grpSpPr>
+        <a:xfrm>
+          <a:off x="0" y="0"/>
+          <a:ext cx="0" cy="0"/>
+          <a:chOff x="0" y="0"/>
+          <a:chExt cx="0" cy="0"/>
+        </a:xfrm>
+      </p:grpSpPr>
+      <p:sp>
+        <p:nvSpPr>
+          <p:cNvPr id="2" name="Title 1"/>
+          <p:cNvSpPr>
+            <a:spLocks noGrp="1"/>
+          </p:cNvSpPr>
+          <p:nvPr>
+            <p:ph type="title"/>
+          </p:nvPr>
+        </p:nvSpPr>
+        <p:spPr/>
+        <p:txBody>
+          <a:bodyPr/>
+          <a:lstStyle/>
+          <a:p>
+            <a:r>
+              <a:rPr lang="en-US" dirty="0" smtClean="0"/>
+              <a:t>FOR LOOP</a:t>
+            </a:r>
+            <a:endParaRPr lang="en-US" dirty="0"/>
+          </a:p>
+        </p:txBody>
+      </p:sp>
+      <p:pic>
+        <p:nvPicPr>
+          <p:cNvPr id="4" name="Content Placeholder 3"/>
+          <p:cNvPicPr>
+            <a:picLocks noGrp="1" noChangeAspect="1"/>
+          </p:cNvPicPr>
+          <p:nvPr>
+            <p:ph idx="1"/>
+          </p:nvPr>
+        </p:nvPicPr>
+        <p:blipFill>
+          <a:blip r:embed="rId2">
+            <a:extLst>
+              <a:ext uri="{28A0092B-C50C-407E-A947-70E740481C1C}">
+                <a14:useLocalDpi xmlns:a14="http://schemas.microsoft.com/office/drawing/2010/main" val="0"/>
+              </a:ext>
+            </a:extLst>
+          </a:blip>
+          <a:stretch>
+            <a:fillRect/>
+          </a:stretch>
+        </p:blipFill>
+        <p:spPr>
+          <a:xfrm>
+            <a:off x="2231136" y="2482015"/>
+            <a:ext cx="2942443" cy="4130896"/>
+          </a:xfrm>
+        </p:spPr>
+      </p:pic>
+      <p:pic>
+        <p:nvPicPr>
+          <p:cNvPr id="5" name="Picture 4"/>
+          <p:cNvPicPr>
+            <a:picLocks noChangeAspect="1"/>
+          </p:cNvPicPr>
+          <p:nvPr/>
+        </p:nvPicPr>
+        <p:blipFill>
+          <a:blip r:embed="rId3">
+            <a:extLst>
+              <a:ext uri="{28A0092B-C50C-407E-A947-70E740481C1C}">
+                <a14:useLocalDpi xmlns:a14="http://schemas.microsoft.com/office/drawing/2010/main" val="0"/>
+              </a:ext>
+            </a:extLst>
+          </a:blip>
+          <a:stretch>
+            <a:fillRect/>
+          </a:stretch>
+        </p:blipFill>
+        <p:spPr>
+          <a:xfrm>
+            <a:off x="5310784" y="3396415"/>
+            <a:ext cx="4650080" cy="1496030"/>
+          </a:xfrm>
+          <a:prstGeom prst="rect">
+            <a:avLst/>
+          </a:prstGeom>
+        </p:spPr>
+      </p:pic>
+    </p:spTree>
+    <p:extLst>
+      <p:ext uri="{BB962C8B-B14F-4D97-AF65-F5344CB8AC3E}">
+        <p14:creationId xmlns:p14="http://schemas.microsoft.com/office/powerpoint/2010/main" val="134989757"/>
+      </p:ext>
+    </p:extLst>
+  </p:cSld>
+  <p:clrMapOvr>
+    <a:masterClrMapping/>
+  </p:clrMapOvr>
+  <p:timing>
+    <p:tnLst>
+      <p:par>
+        <p:cTn id="1" dur="indefinite" restart="never" nodeType="tmRoot"/>
+      </p:par>
+    </p:tnLst>
+  </p:timing>
+</p:sld>
+</file>
+
+<file path=ppt/slides/slide16.xml><?xml version="1.0" encoding="utf-8"?>
+<p:sld xmlns:a="http://schemas.openxmlformats.org/drawingml/2006/main" xmlns:r="http://schemas.openxmlformats.org/officeDocument/2006/relationships" xmlns:p="http://schemas.openxmlformats.org/presentationml/2006/main">
+  <p:cSld>
+    <p:spTree>
+      <p:nvGrpSpPr>
+        <p:cNvPr id="1" name=""/>
+        <p:cNvGrpSpPr/>
+        <p:nvPr/>
+      </p:nvGrpSpPr>
+      <p:grpSpPr>
+        <a:xfrm>
+          <a:off x="0" y="0"/>
+          <a:ext cx="0" cy="0"/>
+          <a:chOff x="0" y="0"/>
+          <a:chExt cx="0" cy="0"/>
+        </a:xfrm>
+      </p:grpSpPr>
+      <p:sp>
+        <p:nvSpPr>
+          <p:cNvPr id="2" name="Title 1"/>
+          <p:cNvSpPr>
+            <a:spLocks noGrp="1"/>
+          </p:cNvSpPr>
+          <p:nvPr>
+            <p:ph type="title"/>
+          </p:nvPr>
+        </p:nvSpPr>
+        <p:spPr/>
+        <p:txBody>
+          <a:bodyPr/>
+          <a:lstStyle/>
+          <a:p>
+            <a:r>
+              <a:rPr lang="en-US" dirty="0" smtClean="0"/>
+              <a:t>WHILE LOOP</a:t>
+            </a:r>
+            <a:endParaRPr lang="en-US" dirty="0"/>
+          </a:p>
+        </p:txBody>
+      </p:sp>
+      <p:pic>
+        <p:nvPicPr>
+          <p:cNvPr id="4" name="Content Placeholder 3"/>
+          <p:cNvPicPr>
+            <a:picLocks noGrp="1" noChangeAspect="1"/>
+          </p:cNvPicPr>
+          <p:nvPr>
+            <p:ph idx="1"/>
+          </p:nvPr>
+        </p:nvPicPr>
+        <p:blipFill>
+          <a:blip r:embed="rId2">
+            <a:extLst>
+              <a:ext uri="{28A0092B-C50C-407E-A947-70E740481C1C}">
+                <a14:useLocalDpi xmlns:a14="http://schemas.microsoft.com/office/drawing/2010/main" val="0"/>
+              </a:ext>
+            </a:extLst>
+          </a:blip>
+          <a:stretch>
+            <a:fillRect/>
+          </a:stretch>
+        </p:blipFill>
+        <p:spPr>
+          <a:xfrm>
+            <a:off x="2231136" y="2518109"/>
+            <a:ext cx="2557432" cy="3928527"/>
+          </a:xfrm>
+        </p:spPr>
+      </p:pic>
+    </p:spTree>
+    <p:extLst>
+      <p:ext uri="{BB962C8B-B14F-4D97-AF65-F5344CB8AC3E}">
+        <p14:creationId xmlns:p14="http://schemas.microsoft.com/office/powerpoint/2010/main" val="717972051"/>
+      </p:ext>
+    </p:extLst>
+  </p:cSld>
+  <p:clrMapOvr>
+    <a:masterClrMapping/>
+  </p:clrMapOvr>
+</p:sld>
+</file>
+
+<file path=ppt/slides/slide17.xml><?xml version="1.0" encoding="utf-8"?>
+<p:sld xmlns:a="http://schemas.openxmlformats.org/drawingml/2006/main" xmlns:r="http://schemas.openxmlformats.org/officeDocument/2006/relationships" xmlns:p="http://schemas.openxmlformats.org/presentationml/2006/main">
+  <p:cSld>
+    <p:spTree>
+      <p:nvGrpSpPr>
+        <p:cNvPr id="1" name=""/>
+        <p:cNvGrpSpPr/>
+        <p:nvPr/>
+      </p:nvGrpSpPr>
+      <p:grpSpPr>
+        <a:xfrm>
+          <a:off x="0" y="0"/>
+          <a:ext cx="0" cy="0"/>
+          <a:chOff x="0" y="0"/>
+          <a:chExt cx="0" cy="0"/>
+        </a:xfrm>
+      </p:grpSpPr>
+      <p:sp>
+        <p:nvSpPr>
+          <p:cNvPr id="2" name="Title 1"/>
+          <p:cNvSpPr>
+            <a:spLocks noGrp="1"/>
+          </p:cNvSpPr>
+          <p:nvPr>
+            <p:ph type="title"/>
+          </p:nvPr>
+        </p:nvSpPr>
+        <p:spPr/>
+        <p:txBody>
+          <a:bodyPr/>
+          <a:lstStyle/>
+          <a:p>
+            <a:r>
+              <a:rPr lang="en-US" dirty="0" smtClean="0"/>
+              <a:t>DO - WHILE</a:t>
+            </a:r>
+            <a:endParaRPr lang="en-US" dirty="0"/>
+          </a:p>
+        </p:txBody>
+      </p:sp>
+      <p:pic>
+        <p:nvPicPr>
+          <p:cNvPr id="4" name="Content Placeholder 3"/>
+          <p:cNvPicPr>
+            <a:picLocks noGrp="1" noChangeAspect="1"/>
+          </p:cNvPicPr>
+          <p:nvPr>
+            <p:ph idx="1"/>
+          </p:nvPr>
+        </p:nvPicPr>
+        <p:blipFill>
+          <a:blip r:embed="rId2">
+            <a:extLst>
+              <a:ext uri="{28A0092B-C50C-407E-A947-70E740481C1C}">
+                <a14:useLocalDpi xmlns:a14="http://schemas.microsoft.com/office/drawing/2010/main" val="0"/>
+              </a:ext>
+            </a:extLst>
+          </a:blip>
+          <a:stretch>
+            <a:fillRect/>
+          </a:stretch>
+        </p:blipFill>
+        <p:spPr>
+          <a:xfrm>
+            <a:off x="2231135" y="2457951"/>
+            <a:ext cx="3088161" cy="3690186"/>
+          </a:xfrm>
+        </p:spPr>
+      </p:pic>
+    </p:spTree>
+    <p:extLst>
+      <p:ext uri="{BB962C8B-B14F-4D97-AF65-F5344CB8AC3E}">
+        <p14:creationId xmlns:p14="http://schemas.microsoft.com/office/powerpoint/2010/main" val="4191372912"/>
+      </p:ext>
+    </p:extLst>
+  </p:cSld>
+  <p:clrMapOvr>
+    <a:masterClrMapping/>
+  </p:clrMapOvr>
+</p:sld>
+</file>
+
+<file path=ppt/slides/slide18.xml><?xml version="1.0" encoding="utf-8"?>
+<p:sld xmlns:a="http://schemas.openxmlformats.org/drawingml/2006/main" xmlns:r="http://schemas.openxmlformats.org/officeDocument/2006/relationships" xmlns:p="http://schemas.openxmlformats.org/presentationml/2006/main">
+  <p:cSld>
+    <p:spTree>
+      <p:nvGrpSpPr>
+        <p:cNvPr id="1" name=""/>
+        <p:cNvGrpSpPr/>
+        <p:nvPr/>
+      </p:nvGrpSpPr>
+      <p:grpSpPr>
+        <a:xfrm>
+          <a:off x="0" y="0"/>
+          <a:ext cx="0" cy="0"/>
+          <a:chOff x="0" y="0"/>
+          <a:chExt cx="0" cy="0"/>
+        </a:xfrm>
+      </p:grpSpPr>
+      <p:sp>
+        <p:nvSpPr>
+          <p:cNvPr id="2" name="Title 1"/>
+          <p:cNvSpPr>
+            <a:spLocks noGrp="1"/>
+          </p:cNvSpPr>
+          <p:nvPr>
+            <p:ph type="title"/>
+          </p:nvPr>
+        </p:nvSpPr>
+        <p:spPr/>
+        <p:txBody>
+          <a:bodyPr/>
+          <a:lstStyle/>
+          <a:p>
+            <a:r>
+              <a:rPr lang="en-US" dirty="0" smtClean="0"/>
+              <a:t>WHILE </a:t>
+            </a:r>
+            <a:r>
+              <a:rPr lang="en-US" dirty="0" err="1" smtClean="0"/>
+              <a:t>vs</a:t>
+            </a:r>
+            <a:r>
+              <a:rPr lang="en-US" dirty="0" smtClean="0"/>
+              <a:t> Do-while</a:t>
+            </a:r>
+            <a:endParaRPr lang="en-US" dirty="0"/>
+          </a:p>
+        </p:txBody>
+      </p:sp>
+      <p:pic>
+        <p:nvPicPr>
+          <p:cNvPr id="4" name="Content Placeholder 3"/>
+          <p:cNvPicPr>
+            <a:picLocks noGrp="1" noChangeAspect="1"/>
+          </p:cNvPicPr>
+          <p:nvPr>
+            <p:ph idx="1"/>
+          </p:nvPr>
+        </p:nvPicPr>
+        <p:blipFill>
+          <a:blip r:embed="rId2">
+            <a:extLst>
+              <a:ext uri="{28A0092B-C50C-407E-A947-70E740481C1C}">
+                <a14:useLocalDpi xmlns:a14="http://schemas.microsoft.com/office/drawing/2010/main" val="0"/>
+              </a:ext>
+            </a:extLst>
+          </a:blip>
+          <a:stretch>
+            <a:fillRect/>
+          </a:stretch>
+        </p:blipFill>
+        <p:spPr>
+          <a:xfrm>
+            <a:off x="3351203" y="2469983"/>
+            <a:ext cx="5489594" cy="4100041"/>
+          </a:xfrm>
+        </p:spPr>
+      </p:pic>
+    </p:spTree>
+    <p:extLst>
+      <p:ext uri="{BB962C8B-B14F-4D97-AF65-F5344CB8AC3E}">
+        <p14:creationId xmlns:p14="http://schemas.microsoft.com/office/powerpoint/2010/main" val="3806514972"/>
+      </p:ext>
+    </p:extLst>
+  </p:cSld>
+  <p:clrMapOvr>
+    <a:masterClrMapping/>
+  </p:clrMapOvr>
+</p:sld>
+</file>
+
+<file path=ppt/slides/slide2.xml><?xml version="1.0" encoding="utf-8"?>
+<p:sld xmlns:a="http://schemas.openxmlformats.org/drawingml/2006/main" xmlns:r="http://schemas.openxmlformats.org/officeDocument/2006/relationships" xmlns:p="http://schemas.openxmlformats.org/presentationml/2006/main">
+  <p:cSld>
+    <p:spTree>
+      <p:nvGrpSpPr>
+        <p:cNvPr id="1" name=""/>
+        <p:cNvGrpSpPr/>
+        <p:nvPr/>
+      </p:nvGrpSpPr>
+      <p:grpSpPr>
+        <a:xfrm>
+          <a:off x="0" y="0"/>
+          <a:ext cx="0" cy="0"/>
+          <a:chOff x="0" y="0"/>
+          <a:chExt cx="0" cy="0"/>
+        </a:xfrm>
+      </p:grpSpPr>
+      <p:sp>
+        <p:nvSpPr>
+          <p:cNvPr id="2" name="Title 1"/>
+          <p:cNvSpPr>
+            <a:spLocks noGrp="1"/>
+          </p:cNvSpPr>
+          <p:nvPr>
+            <p:ph type="title"/>
+          </p:nvPr>
+        </p:nvSpPr>
+        <p:spPr/>
+        <p:txBody>
+          <a:bodyPr/>
+          <a:lstStyle/>
+          <a:p>
+            <a:r>
+              <a:rPr lang="en-US" dirty="0"/>
+              <a:t>Variables and Constants</a:t>
+            </a:r>
+          </a:p>
+        </p:txBody>
+      </p:sp>
+      <p:pic>
+        <p:nvPicPr>
+          <p:cNvPr id="4" name="Content Placeholder 3"/>
+          <p:cNvPicPr>
+            <a:picLocks noGrp="1" noChangeAspect="1"/>
+          </p:cNvPicPr>
+          <p:nvPr>
+            <p:ph idx="1"/>
+          </p:nvPr>
+        </p:nvPicPr>
+        <p:blipFill>
+          <a:blip r:embed="rId2"/>
+          <a:stretch>
+            <a:fillRect/>
+          </a:stretch>
+        </p:blipFill>
+        <p:spPr>
+          <a:xfrm>
+            <a:off x="2227967" y="2638425"/>
+            <a:ext cx="7732897" cy="3170192"/>
+          </a:xfrm>
+          <a:prstGeom prst="rect">
+            <a:avLst/>
+          </a:prstGeom>
+        </p:spPr>
+      </p:pic>
+    </p:spTree>
+    <p:extLst>
+      <p:ext uri="{BB962C8B-B14F-4D97-AF65-F5344CB8AC3E}">
+        <p14:creationId xmlns:p14="http://schemas.microsoft.com/office/powerpoint/2010/main" val="2074803912"/>
+      </p:ext>
+    </p:extLst>
+  </p:cSld>
+  <p:clrMapOvr>
+    <a:masterClrMapping/>
+  </p:clrMapOvr>
+  <p:timing>
+    <p:tnLst>
+      <p:par>
+        <p:cTn id="1" dur="indefinite" restart="never" nodeType="tmRoot"/>
+      </p:par>
+    </p:tnLst>
+  </p:timing>
+</p:sld>
+</file>
+
+<file path=ppt/slides/slide3.xml><?xml version="1.0" encoding="utf-8"?>
+<p:sld xmlns:a="http://schemas.openxmlformats.org/drawingml/2006/main" xmlns:r="http://schemas.openxmlformats.org/officeDocument/2006/relationships" xmlns:p="http://schemas.openxmlformats.org/presentationml/2006/main">
+  <p:cSld>
+    <p:spTree>
+      <p:nvGrpSpPr>
+        <p:cNvPr id="1" name=""/>
+        <p:cNvGrpSpPr/>
+        <p:nvPr/>
+      </p:nvGrpSpPr>
+      <p:grpSpPr>
+        <a:xfrm>
+          <a:off x="0" y="0"/>
+          <a:ext cx="0" cy="0"/>
+          <a:chOff x="0" y="0"/>
+          <a:chExt cx="0" cy="0"/>
+        </a:xfrm>
+      </p:grpSpPr>
+      <p:sp>
+        <p:nvSpPr>
+          <p:cNvPr id="2" name="Title 1"/>
+          <p:cNvSpPr>
+            <a:spLocks noGrp="1"/>
+          </p:cNvSpPr>
+          <p:nvPr>
+            <p:ph type="title"/>
+          </p:nvPr>
+        </p:nvSpPr>
+        <p:spPr/>
+        <p:txBody>
+          <a:bodyPr/>
+          <a:lstStyle/>
+          <a:p>
+            <a:r>
+              <a:rPr lang="en-US" dirty="0" smtClean="0"/>
+              <a:t>TYPES</a:t>
+            </a:r>
+            <a:endParaRPr lang="en-US" dirty="0"/>
+          </a:p>
+        </p:txBody>
+      </p:sp>
+      <p:pic>
+        <p:nvPicPr>
+          <p:cNvPr id="4" name="Content Placeholder 3"/>
+          <p:cNvPicPr>
+            <a:picLocks noGrp="1" noChangeAspect="1"/>
+          </p:cNvPicPr>
+          <p:nvPr>
+            <p:ph idx="1"/>
+          </p:nvPr>
+        </p:nvPicPr>
+        <p:blipFill>
+          <a:blip r:embed="rId2"/>
+          <a:stretch>
+            <a:fillRect/>
+          </a:stretch>
+        </p:blipFill>
+        <p:spPr>
+          <a:xfrm>
+            <a:off x="2231136" y="2430449"/>
+            <a:ext cx="7729727" cy="3517928"/>
+          </a:xfrm>
+          <a:prstGeom prst="rect">
+            <a:avLst/>
+          </a:prstGeom>
+        </p:spPr>
+      </p:pic>
+    </p:spTree>
+    <p:extLst>
+      <p:ext uri="{BB962C8B-B14F-4D97-AF65-F5344CB8AC3E}">
+        <p14:creationId xmlns:p14="http://schemas.microsoft.com/office/powerpoint/2010/main" val="2878619678"/>
+      </p:ext>
+    </p:extLst>
+  </p:cSld>
+  <p:clrMapOvr>
+    <a:masterClrMapping/>
+  </p:clrMapOvr>
+  <p:timing>
+    <p:tnLst>
+      <p:par>
+        <p:cTn id="1" dur="indefinite" restart="never" nodeType="tmRoot"/>
+      </p:par>
+    </p:tnLst>
+  </p:timing>
+</p:sld>
+</file>
+
+<file path=ppt/slides/slide4.xml><?xml version="1.0" encoding="utf-8"?>
+<p:sld xmlns:a="http://schemas.openxmlformats.org/drawingml/2006/main" xmlns:r="http://schemas.openxmlformats.org/officeDocument/2006/relationships" xmlns:p="http://schemas.openxmlformats.org/presentationml/2006/main">
+  <p:cSld>
+    <p:spTree>
+      <p:nvGrpSpPr>
+        <p:cNvPr id="1" name=""/>
+        <p:cNvGrpSpPr/>
+        <p:nvPr/>
+      </p:nvGrpSpPr>
+      <p:grpSpPr>
+        <a:xfrm>
+          <a:off x="0" y="0"/>
+          <a:ext cx="0" cy="0"/>
+          <a:chOff x="0" y="0"/>
+          <a:chExt cx="0" cy="0"/>
+        </a:xfrm>
+      </p:grpSpPr>
+      <p:sp>
+        <p:nvSpPr>
+          <p:cNvPr id="2" name="Title 1"/>
+          <p:cNvSpPr>
+            <a:spLocks noGrp="1"/>
+          </p:cNvSpPr>
+          <p:nvPr>
+            <p:ph type="title"/>
+          </p:nvPr>
+        </p:nvSpPr>
+        <p:spPr/>
+        <p:txBody>
+          <a:bodyPr/>
+          <a:lstStyle/>
+          <a:p>
+            <a:r>
+              <a:rPr lang="en-US" dirty="0" smtClean="0"/>
+              <a:t>TYPES</a:t>
+            </a:r>
+            <a:endParaRPr lang="en-US" dirty="0"/>
+          </a:p>
+        </p:txBody>
+      </p:sp>
+      <p:pic>
+        <p:nvPicPr>
+          <p:cNvPr id="4" name="Content Placeholder 3"/>
+          <p:cNvPicPr>
+            <a:picLocks noGrp="1" noChangeAspect="1"/>
+          </p:cNvPicPr>
+          <p:nvPr>
+            <p:ph idx="1"/>
+          </p:nvPr>
+        </p:nvPicPr>
+        <p:blipFill>
+          <a:blip r:embed="rId2"/>
+          <a:stretch>
+            <a:fillRect/>
+          </a:stretch>
+        </p:blipFill>
+        <p:spPr>
+          <a:xfrm>
+            <a:off x="2231136" y="2221559"/>
+            <a:ext cx="7729728" cy="3935707"/>
+          </a:xfrm>
+          <a:prstGeom prst="rect">
+            <a:avLst/>
+          </a:prstGeom>
+        </p:spPr>
+      </p:pic>
+    </p:spTree>
+    <p:extLst>
+      <p:ext uri="{BB962C8B-B14F-4D97-AF65-F5344CB8AC3E}">
+        <p14:creationId xmlns:p14="http://schemas.microsoft.com/office/powerpoint/2010/main" val="4247198105"/>
+      </p:ext>
+    </p:extLst>
+  </p:cSld>
+  <p:clrMapOvr>
+    <a:masterClrMapping/>
+  </p:clrMapOvr>
+  <p:timing>
+    <p:tnLst>
+      <p:par>
+        <p:cTn id="1" dur="indefinite" restart="never" nodeType="tmRoot"/>
+      </p:par>
+    </p:tnLst>
+  </p:timing>
+</p:sld>
+</file>
+
+<file path=ppt/slides/slide5.xml><?xml version="1.0" encoding="utf-8"?>
+<p:sld xmlns:a="http://schemas.openxmlformats.org/drawingml/2006/main" xmlns:r="http://schemas.openxmlformats.org/officeDocument/2006/relationships" xmlns:p="http://schemas.openxmlformats.org/presentationml/2006/main">
+  <p:cSld>
+    <p:spTree>
+      <p:nvGrpSpPr>
+        <p:cNvPr id="1" name=""/>
+        <p:cNvGrpSpPr/>
+        <p:nvPr/>
+      </p:nvGrpSpPr>
+      <p:grpSpPr>
+        <a:xfrm>
+          <a:off x="0" y="0"/>
+          <a:ext cx="0" cy="0"/>
+          <a:chOff x="0" y="0"/>
+          <a:chExt cx="0" cy="0"/>
+        </a:xfrm>
+      </p:grpSpPr>
+      <p:sp>
+        <p:nvSpPr>
+          <p:cNvPr id="2" name="Title 1"/>
+          <p:cNvSpPr>
+            <a:spLocks noGrp="1"/>
+          </p:cNvSpPr>
+          <p:nvPr>
+            <p:ph type="title"/>
+          </p:nvPr>
+        </p:nvSpPr>
+        <p:spPr/>
+        <p:txBody>
+          <a:bodyPr/>
+          <a:lstStyle/>
+          <a:p>
+            <a:r>
+              <a:rPr lang="en-US" dirty="0" smtClean="0"/>
+              <a:t>SCOPE</a:t>
+            </a:r>
+            <a:endParaRPr lang="en-US" dirty="0"/>
+          </a:p>
+        </p:txBody>
+      </p:sp>
+      <p:pic>
+        <p:nvPicPr>
+          <p:cNvPr id="4" name="Content Placeholder 3"/>
+          <p:cNvPicPr>
+            <a:picLocks noGrp="1" noChangeAspect="1"/>
+          </p:cNvPicPr>
+          <p:nvPr>
+            <p:ph idx="1"/>
+          </p:nvPr>
+        </p:nvPicPr>
+        <p:blipFill>
+          <a:blip r:embed="rId2"/>
+          <a:stretch>
+            <a:fillRect/>
+          </a:stretch>
+        </p:blipFill>
+        <p:spPr>
+          <a:xfrm>
+            <a:off x="2231136" y="2385257"/>
+            <a:ext cx="7729728" cy="3608311"/>
+          </a:xfrm>
+          <a:prstGeom prst="rect">
+            <a:avLst/>
+          </a:prstGeom>
+        </p:spPr>
+      </p:pic>
+    </p:spTree>
+    <p:extLst>
+      <p:ext uri="{BB962C8B-B14F-4D97-AF65-F5344CB8AC3E}">
+        <p14:creationId xmlns:p14="http://schemas.microsoft.com/office/powerpoint/2010/main" val="2042515304"/>
+      </p:ext>
+    </p:extLst>
+  </p:cSld>
+  <p:clrMapOvr>
+    <a:masterClrMapping/>
+  </p:clrMapOvr>
+  <p:timing>
+    <p:tnLst>
+      <p:par>
+        <p:cTn id="1" dur="indefinite" restart="never" nodeType="tmRoot"/>
+      </p:par>
+    </p:tnLst>
+  </p:timing>
+</p:sld>
+</file>
+
+<file path=ppt/slides/slide6.xml><?xml version="1.0" encoding="utf-8"?>
+<p:sld xmlns:a="http://schemas.openxmlformats.org/drawingml/2006/main" xmlns:r="http://schemas.openxmlformats.org/officeDocument/2006/relationships" xmlns:p="http://schemas.openxmlformats.org/presentationml/2006/main">
+  <p:cSld>
+    <p:spTree>
+      <p:nvGrpSpPr>
+        <p:cNvPr id="1" name=""/>
+        <p:cNvGrpSpPr/>
+        <p:nvPr/>
+      </p:nvGrpSpPr>
+      <p:grpSpPr>
+        <a:xfrm>
+          <a:off x="0" y="0"/>
+          <a:ext cx="0" cy="0"/>
+          <a:chOff x="0" y="0"/>
+          <a:chExt cx="0" cy="0"/>
+        </a:xfrm>
+      </p:grpSpPr>
+      <p:sp>
+        <p:nvSpPr>
+          <p:cNvPr id="2" name="Title 1"/>
+          <p:cNvSpPr>
+            <a:spLocks noGrp="1"/>
+          </p:cNvSpPr>
+          <p:nvPr>
+            <p:ph type="title"/>
+          </p:nvPr>
+        </p:nvSpPr>
+        <p:spPr/>
+        <p:txBody>
+          <a:bodyPr/>
+          <a:lstStyle/>
+          <a:p>
+            <a:r>
+              <a:rPr lang="en-US" dirty="0"/>
+              <a:t>ARITHEMIC </a:t>
+            </a:r>
+            <a:r>
+              <a:rPr lang="en-US" dirty="0" smtClean="0"/>
+              <a:t>Operators</a:t>
+            </a:r>
+            <a:endParaRPr lang="en-US" dirty="0"/>
+          </a:p>
+        </p:txBody>
+      </p:sp>
+      <p:pic>
+        <p:nvPicPr>
+          <p:cNvPr id="4" name="Content Placeholder 3"/>
+          <p:cNvPicPr>
+            <a:picLocks noGrp="1" noChangeAspect="1"/>
+          </p:cNvPicPr>
+          <p:nvPr>
+            <p:ph idx="1"/>
+          </p:nvPr>
+        </p:nvPicPr>
+        <p:blipFill>
+          <a:blip r:embed="rId2"/>
+          <a:stretch>
+            <a:fillRect/>
+          </a:stretch>
+        </p:blipFill>
+        <p:spPr>
+          <a:xfrm>
+            <a:off x="2231136" y="2505437"/>
+            <a:ext cx="7725186" cy="3365974"/>
+          </a:xfrm>
+          <a:prstGeom prst="rect">
+            <a:avLst/>
+          </a:prstGeom>
+        </p:spPr>
+      </p:pic>
+    </p:spTree>
+    <p:extLst>
+      <p:ext uri="{BB962C8B-B14F-4D97-AF65-F5344CB8AC3E}">
+        <p14:creationId xmlns:p14="http://schemas.microsoft.com/office/powerpoint/2010/main" val="880077068"/>
+      </p:ext>
+    </p:extLst>
+  </p:cSld>
+  <p:clrMapOvr>
+    <a:masterClrMapping/>
+  </p:clrMapOvr>
+  <p:timing>
+    <p:tnLst>
+      <p:par>
+        <p:cTn id="1" dur="indefinite" restart="never" nodeType="tmRoot"/>
+      </p:par>
+    </p:tnLst>
+  </p:timing>
+</p:sld>
+</file>
+
+<file path=ppt/slides/slide7.xml><?xml version="1.0" encoding="utf-8"?>
+<p:sld xmlns:a="http://schemas.openxmlformats.org/drawingml/2006/main" xmlns:r="http://schemas.openxmlformats.org/officeDocument/2006/relationships" xmlns:p="http://schemas.openxmlformats.org/presentationml/2006/main">
+  <p:cSld>
+    <p:spTree>
+      <p:nvGrpSpPr>
+        <p:cNvPr id="1" name=""/>
+        <p:cNvGrpSpPr/>
+        <p:nvPr/>
+      </p:nvGrpSpPr>
+      <p:grpSpPr>
+        <a:xfrm>
+          <a:off x="0" y="0"/>
+          <a:ext cx="0" cy="0"/>
+          <a:chOff x="0" y="0"/>
+          <a:chExt cx="0" cy="0"/>
+        </a:xfrm>
+      </p:grpSpPr>
+      <p:sp>
+        <p:nvSpPr>
+          <p:cNvPr id="2" name="Title 1"/>
+          <p:cNvSpPr>
+            <a:spLocks noGrp="1"/>
+          </p:cNvSpPr>
+          <p:nvPr>
+            <p:ph type="title"/>
+          </p:nvPr>
+        </p:nvSpPr>
+        <p:spPr/>
+        <p:txBody>
+          <a:bodyPr/>
+          <a:lstStyle/>
+          <a:p>
+            <a:r>
+              <a:rPr lang="en-US" dirty="0" smtClean="0"/>
+              <a:t>ARITHEMIC Operators</a:t>
+            </a:r>
+            <a:endParaRPr lang="en-US" dirty="0"/>
+          </a:p>
+        </p:txBody>
+      </p:sp>
+      <p:pic>
+        <p:nvPicPr>
+          <p:cNvPr id="4" name="Content Placeholder 3"/>
+          <p:cNvPicPr>
+            <a:picLocks noGrp="1" noChangeAspect="1"/>
+          </p:cNvPicPr>
+          <p:nvPr>
+            <p:ph idx="1"/>
+          </p:nvPr>
+        </p:nvPicPr>
+        <p:blipFill>
+          <a:blip r:embed="rId2"/>
+          <a:stretch>
+            <a:fillRect/>
+          </a:stretch>
+        </p:blipFill>
+        <p:spPr>
+          <a:xfrm>
+            <a:off x="2230438" y="3110834"/>
+            <a:ext cx="7731125" cy="2157156"/>
+          </a:xfrm>
+          <a:prstGeom prst="rect">
+            <a:avLst/>
+          </a:prstGeom>
+        </p:spPr>
+      </p:pic>
+    </p:spTree>
+    <p:extLst>
+      <p:ext uri="{BB962C8B-B14F-4D97-AF65-F5344CB8AC3E}">
+        <p14:creationId xmlns:p14="http://schemas.microsoft.com/office/powerpoint/2010/main" val="3317089973"/>
+      </p:ext>
+    </p:extLst>
+  </p:cSld>
+  <p:clrMapOvr>
+    <a:masterClrMapping/>
+  </p:clrMapOvr>
+  <p:timing>
+    <p:tnLst>
+      <p:par>
+        <p:cTn id="1" dur="indefinite" restart="never" nodeType="tmRoot"/>
+      </p:par>
+    </p:tnLst>
+  </p:timing>
+</p:sld>
+</file>
+
+<file path=ppt/slides/slide8.xml><?xml version="1.0" encoding="utf-8"?>
+<p:sld xmlns:a="http://schemas.openxmlformats.org/drawingml/2006/main" xmlns:r="http://schemas.openxmlformats.org/officeDocument/2006/relationships" xmlns:p="http://schemas.openxmlformats.org/presentationml/2006/main">
+  <p:cSld>
+    <p:spTree>
+      <p:nvGrpSpPr>
+        <p:cNvPr id="1" name=""/>
+        <p:cNvGrpSpPr/>
+        <p:nvPr/>
+      </p:nvGrpSpPr>
+      <p:grpSpPr>
+        <a:xfrm>
+          <a:off x="0" y="0"/>
+          <a:ext cx="0" cy="0"/>
+          <a:chOff x="0" y="0"/>
+          <a:chExt cx="0" cy="0"/>
+        </a:xfrm>
+      </p:grpSpPr>
+      <p:sp>
+        <p:nvSpPr>
+          <p:cNvPr id="2" name="Title 1"/>
+          <p:cNvSpPr>
+            <a:spLocks noGrp="1"/>
+          </p:cNvSpPr>
+          <p:nvPr>
+            <p:ph type="title"/>
+          </p:nvPr>
+        </p:nvSpPr>
+        <p:spPr/>
+        <p:txBody>
+          <a:bodyPr/>
+          <a:lstStyle/>
+          <a:p>
+            <a:r>
+              <a:rPr lang="en-US" dirty="0" smtClean="0"/>
+              <a:t>COMPARISON OPERATORS</a:t>
+            </a:r>
+            <a:endParaRPr lang="en-US" dirty="0"/>
+          </a:p>
+        </p:txBody>
+      </p:sp>
+      <p:pic>
+        <p:nvPicPr>
+          <p:cNvPr id="4" name="Content Placeholder 3"/>
+          <p:cNvPicPr>
+            <a:picLocks noGrp="1" noChangeAspect="1"/>
+          </p:cNvPicPr>
+          <p:nvPr>
+            <p:ph idx="1"/>
+          </p:nvPr>
+        </p:nvPicPr>
+        <p:blipFill>
+          <a:blip r:embed="rId2"/>
+          <a:stretch>
+            <a:fillRect/>
+          </a:stretch>
+        </p:blipFill>
+        <p:spPr>
+          <a:xfrm>
+            <a:off x="2231136" y="2638425"/>
+            <a:ext cx="7724427" cy="3353301"/>
+          </a:xfrm>
+          <a:prstGeom prst="rect">
+            <a:avLst/>
+          </a:prstGeom>
+        </p:spPr>
+      </p:pic>
+    </p:spTree>
+    <p:extLst>
+      <p:ext uri="{BB962C8B-B14F-4D97-AF65-F5344CB8AC3E}">
+        <p14:creationId xmlns:p14="http://schemas.microsoft.com/office/powerpoint/2010/main" val="1449010644"/>
+      </p:ext>
+    </p:extLst>
+  </p:cSld>
+  <p:clrMapOvr>
+    <a:masterClrMapping/>
+  </p:clrMapOvr>
+  <p:timing>
+    <p:tnLst>
+      <p:par>
+        <p:cTn id="1" dur="indefinite" restart="never" nodeType="tmRoot"/>
+      </p:par>
+    </p:tnLst>
+  </p:timing>
+</p:sld>
+</file>
+
+<file path=ppt/slides/slide9.xml><?xml version="1.0" encoding="utf-8"?>
+<p:sld xmlns:a="http://schemas.openxmlformats.org/drawingml/2006/main" xmlns:r="http://schemas.openxmlformats.org/officeDocument/2006/relationships" xmlns:p="http://schemas.openxmlformats.org/presentationml/2006/main">
+  <p:cSld>
+    <p:spTree>
+      <p:nvGrpSpPr>
+        <p:cNvPr id="1" name=""/>
+        <p:cNvGrpSpPr/>
+        <p:nvPr/>
+      </p:nvGrpSpPr>
+      <p:grpSpPr>
+        <a:xfrm>
+          <a:off x="0" y="0"/>
+          <a:ext cx="0" cy="0"/>
+          <a:chOff x="0" y="0"/>
+          <a:chExt cx="0" cy="0"/>
+        </a:xfrm>
+      </p:grpSpPr>
+      <p:sp>
+        <p:nvSpPr>
+          <p:cNvPr id="2" name="Title 1"/>
+          <p:cNvSpPr>
+            <a:spLocks noGrp="1"/>
+          </p:cNvSpPr>
+          <p:nvPr>
+            <p:ph type="title"/>
+          </p:nvPr>
+        </p:nvSpPr>
+        <p:spPr/>
+        <p:txBody>
+          <a:bodyPr/>
+          <a:lstStyle/>
+          <a:p>
+            <a:r>
+              <a:rPr lang="en-US" dirty="0" smtClean="0"/>
+              <a:t>ASSIGNMENT OPERATORS</a:t>
+            </a:r>
+            <a:endParaRPr lang="en-US" dirty="0"/>
+          </a:p>
+        </p:txBody>
+      </p:sp>
+      <p:pic>
+        <p:nvPicPr>
+          <p:cNvPr id="6" name="Content Placeholder 5"/>
+          <p:cNvPicPr>
+            <a:picLocks noGrp="1" noChangeAspect="1"/>
+          </p:cNvPicPr>
+          <p:nvPr>
+            <p:ph idx="1"/>
+          </p:nvPr>
+        </p:nvPicPr>
+        <p:blipFill>
+          <a:blip r:embed="rId2"/>
+          <a:stretch>
+            <a:fillRect/>
+          </a:stretch>
+        </p:blipFill>
+        <p:spPr>
+          <a:xfrm>
+            <a:off x="2230438" y="2733418"/>
+            <a:ext cx="7731125" cy="2911988"/>
+          </a:xfrm>
+          <a:prstGeom prst="rect">
+            <a:avLst/>
+          </a:prstGeom>
+        </p:spPr>
+      </p:pic>
+    </p:spTree>
+    <p:extLst>
+      <p:ext uri="{BB962C8B-B14F-4D97-AF65-F5344CB8AC3E}">
+        <p14:creationId xmlns:p14="http://schemas.microsoft.com/office/powerpoint/2010/main" val="1793056558"/>
+      </p:ext>
+    </p:extLst>
+  </p:cSld>
+  <p:clrMapOvr>
+    <a:masterClrMapping/>
+  </p:clrMapOvr>
+  <p:timing>
+    <p:tnLst>
+      <p:par>
+        <p:cTn id="1" dur="indefinite" restart="never" nodeType="tmRoot"/>
+      </p:par>
+    </p:tnLst>
+  </p:timing>
 </p:sld>
 </file>
 

</xml_diff>

<commit_message>
add content to Day 1 slide
</commit_message>
<xml_diff>
--- a/Documents/Day1.pptx
+++ b/Documents/Day1.pptx
@@ -9,20 +9,24 @@
     <p:sldId id="257" r:id="rId3"/>
     <p:sldId id="260" r:id="rId4"/>
     <p:sldId id="261" r:id="rId5"/>
-    <p:sldId id="262" r:id="rId6"/>
-    <p:sldId id="258" r:id="rId7"/>
-    <p:sldId id="263" r:id="rId8"/>
-    <p:sldId id="259" r:id="rId9"/>
-    <p:sldId id="264" r:id="rId10"/>
-    <p:sldId id="267" r:id="rId11"/>
-    <p:sldId id="265" r:id="rId12"/>
-    <p:sldId id="266" r:id="rId13"/>
-    <p:sldId id="268" r:id="rId14"/>
-    <p:sldId id="273" r:id="rId15"/>
-    <p:sldId id="269" r:id="rId16"/>
-    <p:sldId id="270" r:id="rId17"/>
-    <p:sldId id="271" r:id="rId18"/>
-    <p:sldId id="272" r:id="rId19"/>
+    <p:sldId id="274" r:id="rId6"/>
+    <p:sldId id="275" r:id="rId7"/>
+    <p:sldId id="276" r:id="rId8"/>
+    <p:sldId id="277" r:id="rId9"/>
+    <p:sldId id="262" r:id="rId10"/>
+    <p:sldId id="258" r:id="rId11"/>
+    <p:sldId id="263" r:id="rId12"/>
+    <p:sldId id="259" r:id="rId13"/>
+    <p:sldId id="264" r:id="rId14"/>
+    <p:sldId id="267" r:id="rId15"/>
+    <p:sldId id="265" r:id="rId16"/>
+    <p:sldId id="266" r:id="rId17"/>
+    <p:sldId id="268" r:id="rId18"/>
+    <p:sldId id="273" r:id="rId19"/>
+    <p:sldId id="269" r:id="rId20"/>
+    <p:sldId id="270" r:id="rId21"/>
+    <p:sldId id="271" r:id="rId22"/>
+    <p:sldId id="272" r:id="rId23"/>
   </p:sldIdLst>
   <p:sldSz cx="12192000" cy="6858000"/>
   <p:notesSz cx="6858000" cy="9144000"/>
@@ -3404,6 +3408,354 @@
             <a:spLocks noGrp="1"/>
           </p:cNvSpPr>
           <p:nvPr>
+            <p:ph type="title"/>
+          </p:nvPr>
+        </p:nvSpPr>
+        <p:spPr/>
+        <p:txBody>
+          <a:bodyPr/>
+          <a:lstStyle/>
+          <a:p>
+            <a:r>
+              <a:rPr lang="en-US" dirty="0"/>
+              <a:t>ARITHEMIC </a:t>
+            </a:r>
+            <a:r>
+              <a:rPr lang="en-US" dirty="0" smtClean="0"/>
+              <a:t>Operators</a:t>
+            </a:r>
+            <a:endParaRPr lang="en-US" dirty="0"/>
+          </a:p>
+        </p:txBody>
+      </p:sp>
+      <p:pic>
+        <p:nvPicPr>
+          <p:cNvPr id="4" name="Content Placeholder 3"/>
+          <p:cNvPicPr>
+            <a:picLocks noGrp="1" noChangeAspect="1"/>
+          </p:cNvPicPr>
+          <p:nvPr>
+            <p:ph idx="1"/>
+          </p:nvPr>
+        </p:nvPicPr>
+        <p:blipFill>
+          <a:blip r:embed="rId2"/>
+          <a:stretch>
+            <a:fillRect/>
+          </a:stretch>
+        </p:blipFill>
+        <p:spPr>
+          <a:xfrm>
+            <a:off x="2231136" y="2505437"/>
+            <a:ext cx="7725186" cy="3365974"/>
+          </a:xfrm>
+          <a:prstGeom prst="rect">
+            <a:avLst/>
+          </a:prstGeom>
+        </p:spPr>
+      </p:pic>
+    </p:spTree>
+    <p:extLst>
+      <p:ext uri="{BB962C8B-B14F-4D97-AF65-F5344CB8AC3E}">
+        <p14:creationId xmlns:p14="http://schemas.microsoft.com/office/powerpoint/2010/main" val="880077068"/>
+      </p:ext>
+    </p:extLst>
+  </p:cSld>
+  <p:clrMapOvr>
+    <a:masterClrMapping/>
+  </p:clrMapOvr>
+  <p:timing>
+    <p:tnLst>
+      <p:par>
+        <p:cTn id="1" dur="indefinite" restart="never" nodeType="tmRoot"/>
+      </p:par>
+    </p:tnLst>
+  </p:timing>
+</p:sld>
+</file>
+
+<file path=ppt/slides/slide11.xml><?xml version="1.0" encoding="utf-8"?>
+<p:sld xmlns:a="http://schemas.openxmlformats.org/drawingml/2006/main" xmlns:r="http://schemas.openxmlformats.org/officeDocument/2006/relationships" xmlns:p="http://schemas.openxmlformats.org/presentationml/2006/main">
+  <p:cSld>
+    <p:spTree>
+      <p:nvGrpSpPr>
+        <p:cNvPr id="1" name=""/>
+        <p:cNvGrpSpPr/>
+        <p:nvPr/>
+      </p:nvGrpSpPr>
+      <p:grpSpPr>
+        <a:xfrm>
+          <a:off x="0" y="0"/>
+          <a:ext cx="0" cy="0"/>
+          <a:chOff x="0" y="0"/>
+          <a:chExt cx="0" cy="0"/>
+        </a:xfrm>
+      </p:grpSpPr>
+      <p:sp>
+        <p:nvSpPr>
+          <p:cNvPr id="2" name="Title 1"/>
+          <p:cNvSpPr>
+            <a:spLocks noGrp="1"/>
+          </p:cNvSpPr>
+          <p:nvPr>
+            <p:ph type="title"/>
+          </p:nvPr>
+        </p:nvSpPr>
+        <p:spPr/>
+        <p:txBody>
+          <a:bodyPr/>
+          <a:lstStyle/>
+          <a:p>
+            <a:r>
+              <a:rPr lang="en-US" dirty="0" smtClean="0"/>
+              <a:t>ARITHEMIC Operators</a:t>
+            </a:r>
+            <a:endParaRPr lang="en-US" dirty="0"/>
+          </a:p>
+        </p:txBody>
+      </p:sp>
+      <p:pic>
+        <p:nvPicPr>
+          <p:cNvPr id="4" name="Content Placeholder 3"/>
+          <p:cNvPicPr>
+            <a:picLocks noGrp="1" noChangeAspect="1"/>
+          </p:cNvPicPr>
+          <p:nvPr>
+            <p:ph idx="1"/>
+          </p:nvPr>
+        </p:nvPicPr>
+        <p:blipFill>
+          <a:blip r:embed="rId2"/>
+          <a:stretch>
+            <a:fillRect/>
+          </a:stretch>
+        </p:blipFill>
+        <p:spPr>
+          <a:xfrm>
+            <a:off x="2230438" y="3110834"/>
+            <a:ext cx="7731125" cy="2157156"/>
+          </a:xfrm>
+          <a:prstGeom prst="rect">
+            <a:avLst/>
+          </a:prstGeom>
+        </p:spPr>
+      </p:pic>
+    </p:spTree>
+    <p:extLst>
+      <p:ext uri="{BB962C8B-B14F-4D97-AF65-F5344CB8AC3E}">
+        <p14:creationId xmlns:p14="http://schemas.microsoft.com/office/powerpoint/2010/main" val="3317089973"/>
+      </p:ext>
+    </p:extLst>
+  </p:cSld>
+  <p:clrMapOvr>
+    <a:masterClrMapping/>
+  </p:clrMapOvr>
+  <p:timing>
+    <p:tnLst>
+      <p:par>
+        <p:cTn id="1" dur="indefinite" restart="never" nodeType="tmRoot"/>
+      </p:par>
+    </p:tnLst>
+  </p:timing>
+</p:sld>
+</file>
+
+<file path=ppt/slides/slide12.xml><?xml version="1.0" encoding="utf-8"?>
+<p:sld xmlns:a="http://schemas.openxmlformats.org/drawingml/2006/main" xmlns:r="http://schemas.openxmlformats.org/officeDocument/2006/relationships" xmlns:p="http://schemas.openxmlformats.org/presentationml/2006/main">
+  <p:cSld>
+    <p:spTree>
+      <p:nvGrpSpPr>
+        <p:cNvPr id="1" name=""/>
+        <p:cNvGrpSpPr/>
+        <p:nvPr/>
+      </p:nvGrpSpPr>
+      <p:grpSpPr>
+        <a:xfrm>
+          <a:off x="0" y="0"/>
+          <a:ext cx="0" cy="0"/>
+          <a:chOff x="0" y="0"/>
+          <a:chExt cx="0" cy="0"/>
+        </a:xfrm>
+      </p:grpSpPr>
+      <p:sp>
+        <p:nvSpPr>
+          <p:cNvPr id="2" name="Title 1"/>
+          <p:cNvSpPr>
+            <a:spLocks noGrp="1"/>
+          </p:cNvSpPr>
+          <p:nvPr>
+            <p:ph type="title"/>
+          </p:nvPr>
+        </p:nvSpPr>
+        <p:spPr/>
+        <p:txBody>
+          <a:bodyPr/>
+          <a:lstStyle/>
+          <a:p>
+            <a:r>
+              <a:rPr lang="en-US" dirty="0" smtClean="0"/>
+              <a:t>COMPARISON OPERATORS</a:t>
+            </a:r>
+            <a:endParaRPr lang="en-US" dirty="0"/>
+          </a:p>
+        </p:txBody>
+      </p:sp>
+      <p:pic>
+        <p:nvPicPr>
+          <p:cNvPr id="4" name="Content Placeholder 3"/>
+          <p:cNvPicPr>
+            <a:picLocks noGrp="1" noChangeAspect="1"/>
+          </p:cNvPicPr>
+          <p:nvPr>
+            <p:ph idx="1"/>
+          </p:nvPr>
+        </p:nvPicPr>
+        <p:blipFill>
+          <a:blip r:embed="rId2"/>
+          <a:stretch>
+            <a:fillRect/>
+          </a:stretch>
+        </p:blipFill>
+        <p:spPr>
+          <a:xfrm>
+            <a:off x="2231136" y="2638425"/>
+            <a:ext cx="7724427" cy="3353301"/>
+          </a:xfrm>
+          <a:prstGeom prst="rect">
+            <a:avLst/>
+          </a:prstGeom>
+        </p:spPr>
+      </p:pic>
+    </p:spTree>
+    <p:extLst>
+      <p:ext uri="{BB962C8B-B14F-4D97-AF65-F5344CB8AC3E}">
+        <p14:creationId xmlns:p14="http://schemas.microsoft.com/office/powerpoint/2010/main" val="1449010644"/>
+      </p:ext>
+    </p:extLst>
+  </p:cSld>
+  <p:clrMapOvr>
+    <a:masterClrMapping/>
+  </p:clrMapOvr>
+  <p:timing>
+    <p:tnLst>
+      <p:par>
+        <p:cTn id="1" dur="indefinite" restart="never" nodeType="tmRoot"/>
+      </p:par>
+    </p:tnLst>
+  </p:timing>
+</p:sld>
+</file>
+
+<file path=ppt/slides/slide13.xml><?xml version="1.0" encoding="utf-8"?>
+<p:sld xmlns:a="http://schemas.openxmlformats.org/drawingml/2006/main" xmlns:r="http://schemas.openxmlformats.org/officeDocument/2006/relationships" xmlns:p="http://schemas.openxmlformats.org/presentationml/2006/main">
+  <p:cSld>
+    <p:spTree>
+      <p:nvGrpSpPr>
+        <p:cNvPr id="1" name=""/>
+        <p:cNvGrpSpPr/>
+        <p:nvPr/>
+      </p:nvGrpSpPr>
+      <p:grpSpPr>
+        <a:xfrm>
+          <a:off x="0" y="0"/>
+          <a:ext cx="0" cy="0"/>
+          <a:chOff x="0" y="0"/>
+          <a:chExt cx="0" cy="0"/>
+        </a:xfrm>
+      </p:grpSpPr>
+      <p:sp>
+        <p:nvSpPr>
+          <p:cNvPr id="2" name="Title 1"/>
+          <p:cNvSpPr>
+            <a:spLocks noGrp="1"/>
+          </p:cNvSpPr>
+          <p:nvPr>
+            <p:ph type="title"/>
+          </p:nvPr>
+        </p:nvSpPr>
+        <p:spPr/>
+        <p:txBody>
+          <a:bodyPr/>
+          <a:lstStyle/>
+          <a:p>
+            <a:r>
+              <a:rPr lang="en-US" dirty="0" smtClean="0"/>
+              <a:t>ASSIGNMENT OPERATORS</a:t>
+            </a:r>
+            <a:endParaRPr lang="en-US" dirty="0"/>
+          </a:p>
+        </p:txBody>
+      </p:sp>
+      <p:pic>
+        <p:nvPicPr>
+          <p:cNvPr id="6" name="Content Placeholder 5"/>
+          <p:cNvPicPr>
+            <a:picLocks noGrp="1" noChangeAspect="1"/>
+          </p:cNvPicPr>
+          <p:nvPr>
+            <p:ph idx="1"/>
+          </p:nvPr>
+        </p:nvPicPr>
+        <p:blipFill>
+          <a:blip r:embed="rId2"/>
+          <a:stretch>
+            <a:fillRect/>
+          </a:stretch>
+        </p:blipFill>
+        <p:spPr>
+          <a:xfrm>
+            <a:off x="2230438" y="2733418"/>
+            <a:ext cx="7731125" cy="2911988"/>
+          </a:xfrm>
+          <a:prstGeom prst="rect">
+            <a:avLst/>
+          </a:prstGeom>
+        </p:spPr>
+      </p:pic>
+    </p:spTree>
+    <p:extLst>
+      <p:ext uri="{BB962C8B-B14F-4D97-AF65-F5344CB8AC3E}">
+        <p14:creationId xmlns:p14="http://schemas.microsoft.com/office/powerpoint/2010/main" val="1793056558"/>
+      </p:ext>
+    </p:extLst>
+  </p:cSld>
+  <p:clrMapOvr>
+    <a:masterClrMapping/>
+  </p:clrMapOvr>
+  <p:timing>
+    <p:tnLst>
+      <p:par>
+        <p:cTn id="1" dur="indefinite" restart="never" nodeType="tmRoot"/>
+      </p:par>
+    </p:tnLst>
+  </p:timing>
+</p:sld>
+</file>
+
+<file path=ppt/slides/slide14.xml><?xml version="1.0" encoding="utf-8"?>
+<p:sld xmlns:a="http://schemas.openxmlformats.org/drawingml/2006/main" xmlns:r="http://schemas.openxmlformats.org/officeDocument/2006/relationships" xmlns:p="http://schemas.openxmlformats.org/presentationml/2006/main">
+  <p:cSld>
+    <p:spTree>
+      <p:nvGrpSpPr>
+        <p:cNvPr id="1" name=""/>
+        <p:cNvGrpSpPr/>
+        <p:nvPr/>
+      </p:nvGrpSpPr>
+      <p:grpSpPr>
+        <a:xfrm>
+          <a:off x="0" y="0"/>
+          <a:ext cx="0" cy="0"/>
+          <a:chOff x="0" y="0"/>
+          <a:chExt cx="0" cy="0"/>
+        </a:xfrm>
+      </p:grpSpPr>
+      <p:sp>
+        <p:nvSpPr>
+          <p:cNvPr id="2" name="Title 1"/>
+          <p:cNvSpPr>
+            <a:spLocks noGrp="1"/>
+          </p:cNvSpPr>
+          <p:nvPr>
             <p:ph type="ctrTitle"/>
           </p:nvPr>
         </p:nvSpPr>
@@ -3469,7 +3821,7 @@
 </p:sld>
 </file>
 
-<file path=ppt/slides/slide11.xml><?xml version="1.0" encoding="utf-8"?>
+<file path=ppt/slides/slide15.xml><?xml version="1.0" encoding="utf-8"?>
 <p:sld xmlns:a="http://schemas.openxmlformats.org/drawingml/2006/main" xmlns:r="http://schemas.openxmlformats.org/officeDocument/2006/relationships" xmlns:p="http://schemas.openxmlformats.org/presentationml/2006/main">
   <p:cSld>
     <p:spTree>
@@ -3582,7 +3934,7 @@
 </p:sld>
 </file>
 
-<file path=ppt/slides/slide12.xml><?xml version="1.0" encoding="utf-8"?>
+<file path=ppt/slides/slide16.xml><?xml version="1.0" encoding="utf-8"?>
 <p:sld xmlns:a="http://schemas.openxmlformats.org/drawingml/2006/main" xmlns:r="http://schemas.openxmlformats.org/officeDocument/2006/relationships" xmlns:p="http://schemas.openxmlformats.org/presentationml/2006/main">
   <p:cSld>
     <p:spTree>
@@ -3695,7 +4047,7 @@
 </p:sld>
 </file>
 
-<file path=ppt/slides/slide13.xml><?xml version="1.0" encoding="utf-8"?>
+<file path=ppt/slides/slide17.xml><?xml version="1.0" encoding="utf-8"?>
 <p:sld xmlns:a="http://schemas.openxmlformats.org/drawingml/2006/main" xmlns:r="http://schemas.openxmlformats.org/officeDocument/2006/relationships" xmlns:p="http://schemas.openxmlformats.org/presentationml/2006/main">
   <p:cSld>
     <p:spTree>
@@ -3796,7 +4148,7 @@
 </p:sld>
 </file>
 
-<file path=ppt/slides/slide14.xml><?xml version="1.0" encoding="utf-8"?>
+<file path=ppt/slides/slide18.xml><?xml version="1.0" encoding="utf-8"?>
 <p:sld xmlns:a="http://schemas.openxmlformats.org/drawingml/2006/main" xmlns:r="http://schemas.openxmlformats.org/officeDocument/2006/relationships" xmlns:p="http://schemas.openxmlformats.org/presentationml/2006/main">
   <p:cSld>
     <p:spTree>
@@ -3878,7 +4230,7 @@
 </p:sld>
 </file>
 
-<file path=ppt/slides/slide15.xml><?xml version="1.0" encoding="utf-8"?>
+<file path=ppt/slides/slide19.xml><?xml version="1.0" encoding="utf-8"?>
 <p:sld xmlns:a="http://schemas.openxmlformats.org/drawingml/2006/main" xmlns:r="http://schemas.openxmlformats.org/officeDocument/2006/relationships" xmlns:p="http://schemas.openxmlformats.org/presentationml/2006/main">
   <p:cSld>
     <p:spTree>
@@ -3997,260 +4349,6 @@
 </p:sld>
 </file>
 
-<file path=ppt/slides/slide16.xml><?xml version="1.0" encoding="utf-8"?>
-<p:sld xmlns:a="http://schemas.openxmlformats.org/drawingml/2006/main" xmlns:r="http://schemas.openxmlformats.org/officeDocument/2006/relationships" xmlns:p="http://schemas.openxmlformats.org/presentationml/2006/main">
-  <p:cSld>
-    <p:spTree>
-      <p:nvGrpSpPr>
-        <p:cNvPr id="1" name=""/>
-        <p:cNvGrpSpPr/>
-        <p:nvPr/>
-      </p:nvGrpSpPr>
-      <p:grpSpPr>
-        <a:xfrm>
-          <a:off x="0" y="0"/>
-          <a:ext cx="0" cy="0"/>
-          <a:chOff x="0" y="0"/>
-          <a:chExt cx="0" cy="0"/>
-        </a:xfrm>
-      </p:grpSpPr>
-      <p:sp>
-        <p:nvSpPr>
-          <p:cNvPr id="2" name="Title 1"/>
-          <p:cNvSpPr>
-            <a:spLocks noGrp="1"/>
-          </p:cNvSpPr>
-          <p:nvPr>
-            <p:ph type="title"/>
-          </p:nvPr>
-        </p:nvSpPr>
-        <p:spPr/>
-        <p:txBody>
-          <a:bodyPr/>
-          <a:lstStyle/>
-          <a:p>
-            <a:r>
-              <a:rPr lang="en-US" dirty="0" smtClean="0"/>
-              <a:t>WHILE LOOP</a:t>
-            </a:r>
-            <a:endParaRPr lang="en-US" dirty="0"/>
-          </a:p>
-        </p:txBody>
-      </p:sp>
-      <p:pic>
-        <p:nvPicPr>
-          <p:cNvPr id="4" name="Content Placeholder 3"/>
-          <p:cNvPicPr>
-            <a:picLocks noGrp="1" noChangeAspect="1"/>
-          </p:cNvPicPr>
-          <p:nvPr>
-            <p:ph idx="1"/>
-          </p:nvPr>
-        </p:nvPicPr>
-        <p:blipFill>
-          <a:blip r:embed="rId2">
-            <a:extLst>
-              <a:ext uri="{28A0092B-C50C-407E-A947-70E740481C1C}">
-                <a14:useLocalDpi xmlns:a14="http://schemas.microsoft.com/office/drawing/2010/main" val="0"/>
-              </a:ext>
-            </a:extLst>
-          </a:blip>
-          <a:stretch>
-            <a:fillRect/>
-          </a:stretch>
-        </p:blipFill>
-        <p:spPr>
-          <a:xfrm>
-            <a:off x="2231136" y="2518109"/>
-            <a:ext cx="2557432" cy="3928527"/>
-          </a:xfrm>
-        </p:spPr>
-      </p:pic>
-    </p:spTree>
-    <p:extLst>
-      <p:ext uri="{BB962C8B-B14F-4D97-AF65-F5344CB8AC3E}">
-        <p14:creationId xmlns:p14="http://schemas.microsoft.com/office/powerpoint/2010/main" val="717972051"/>
-      </p:ext>
-    </p:extLst>
-  </p:cSld>
-  <p:clrMapOvr>
-    <a:masterClrMapping/>
-  </p:clrMapOvr>
-</p:sld>
-</file>
-
-<file path=ppt/slides/slide17.xml><?xml version="1.0" encoding="utf-8"?>
-<p:sld xmlns:a="http://schemas.openxmlformats.org/drawingml/2006/main" xmlns:r="http://schemas.openxmlformats.org/officeDocument/2006/relationships" xmlns:p="http://schemas.openxmlformats.org/presentationml/2006/main">
-  <p:cSld>
-    <p:spTree>
-      <p:nvGrpSpPr>
-        <p:cNvPr id="1" name=""/>
-        <p:cNvGrpSpPr/>
-        <p:nvPr/>
-      </p:nvGrpSpPr>
-      <p:grpSpPr>
-        <a:xfrm>
-          <a:off x="0" y="0"/>
-          <a:ext cx="0" cy="0"/>
-          <a:chOff x="0" y="0"/>
-          <a:chExt cx="0" cy="0"/>
-        </a:xfrm>
-      </p:grpSpPr>
-      <p:sp>
-        <p:nvSpPr>
-          <p:cNvPr id="2" name="Title 1"/>
-          <p:cNvSpPr>
-            <a:spLocks noGrp="1"/>
-          </p:cNvSpPr>
-          <p:nvPr>
-            <p:ph type="title"/>
-          </p:nvPr>
-        </p:nvSpPr>
-        <p:spPr/>
-        <p:txBody>
-          <a:bodyPr/>
-          <a:lstStyle/>
-          <a:p>
-            <a:r>
-              <a:rPr lang="en-US" dirty="0" smtClean="0"/>
-              <a:t>DO - WHILE</a:t>
-            </a:r>
-            <a:endParaRPr lang="en-US" dirty="0"/>
-          </a:p>
-        </p:txBody>
-      </p:sp>
-      <p:pic>
-        <p:nvPicPr>
-          <p:cNvPr id="4" name="Content Placeholder 3"/>
-          <p:cNvPicPr>
-            <a:picLocks noGrp="1" noChangeAspect="1"/>
-          </p:cNvPicPr>
-          <p:nvPr>
-            <p:ph idx="1"/>
-          </p:nvPr>
-        </p:nvPicPr>
-        <p:blipFill>
-          <a:blip r:embed="rId2">
-            <a:extLst>
-              <a:ext uri="{28A0092B-C50C-407E-A947-70E740481C1C}">
-                <a14:useLocalDpi xmlns:a14="http://schemas.microsoft.com/office/drawing/2010/main" val="0"/>
-              </a:ext>
-            </a:extLst>
-          </a:blip>
-          <a:stretch>
-            <a:fillRect/>
-          </a:stretch>
-        </p:blipFill>
-        <p:spPr>
-          <a:xfrm>
-            <a:off x="2231135" y="2457951"/>
-            <a:ext cx="3088161" cy="3690186"/>
-          </a:xfrm>
-        </p:spPr>
-      </p:pic>
-    </p:spTree>
-    <p:extLst>
-      <p:ext uri="{BB962C8B-B14F-4D97-AF65-F5344CB8AC3E}">
-        <p14:creationId xmlns:p14="http://schemas.microsoft.com/office/powerpoint/2010/main" val="4191372912"/>
-      </p:ext>
-    </p:extLst>
-  </p:cSld>
-  <p:clrMapOvr>
-    <a:masterClrMapping/>
-  </p:clrMapOvr>
-</p:sld>
-</file>
-
-<file path=ppt/slides/slide18.xml><?xml version="1.0" encoding="utf-8"?>
-<p:sld xmlns:a="http://schemas.openxmlformats.org/drawingml/2006/main" xmlns:r="http://schemas.openxmlformats.org/officeDocument/2006/relationships" xmlns:p="http://schemas.openxmlformats.org/presentationml/2006/main">
-  <p:cSld>
-    <p:spTree>
-      <p:nvGrpSpPr>
-        <p:cNvPr id="1" name=""/>
-        <p:cNvGrpSpPr/>
-        <p:nvPr/>
-      </p:nvGrpSpPr>
-      <p:grpSpPr>
-        <a:xfrm>
-          <a:off x="0" y="0"/>
-          <a:ext cx="0" cy="0"/>
-          <a:chOff x="0" y="0"/>
-          <a:chExt cx="0" cy="0"/>
-        </a:xfrm>
-      </p:grpSpPr>
-      <p:sp>
-        <p:nvSpPr>
-          <p:cNvPr id="2" name="Title 1"/>
-          <p:cNvSpPr>
-            <a:spLocks noGrp="1"/>
-          </p:cNvSpPr>
-          <p:nvPr>
-            <p:ph type="title"/>
-          </p:nvPr>
-        </p:nvSpPr>
-        <p:spPr/>
-        <p:txBody>
-          <a:bodyPr/>
-          <a:lstStyle/>
-          <a:p>
-            <a:r>
-              <a:rPr lang="en-US" dirty="0" smtClean="0"/>
-              <a:t>WHILE </a:t>
-            </a:r>
-            <a:r>
-              <a:rPr lang="en-US" dirty="0" err="1" smtClean="0"/>
-              <a:t>vs</a:t>
-            </a:r>
-            <a:r>
-              <a:rPr lang="en-US" dirty="0" smtClean="0"/>
-              <a:t> Do-while</a:t>
-            </a:r>
-            <a:endParaRPr lang="en-US" dirty="0"/>
-          </a:p>
-        </p:txBody>
-      </p:sp>
-      <p:pic>
-        <p:nvPicPr>
-          <p:cNvPr id="4" name="Content Placeholder 3"/>
-          <p:cNvPicPr>
-            <a:picLocks noGrp="1" noChangeAspect="1"/>
-          </p:cNvPicPr>
-          <p:nvPr>
-            <p:ph idx="1"/>
-          </p:nvPr>
-        </p:nvPicPr>
-        <p:blipFill>
-          <a:blip r:embed="rId2">
-            <a:extLst>
-              <a:ext uri="{28A0092B-C50C-407E-A947-70E740481C1C}">
-                <a14:useLocalDpi xmlns:a14="http://schemas.microsoft.com/office/drawing/2010/main" val="0"/>
-              </a:ext>
-            </a:extLst>
-          </a:blip>
-          <a:stretch>
-            <a:fillRect/>
-          </a:stretch>
-        </p:blipFill>
-        <p:spPr>
-          <a:xfrm>
-            <a:off x="3351203" y="2469983"/>
-            <a:ext cx="5489594" cy="4100041"/>
-          </a:xfrm>
-        </p:spPr>
-      </p:pic>
-    </p:spTree>
-    <p:extLst>
-      <p:ext uri="{BB962C8B-B14F-4D97-AF65-F5344CB8AC3E}">
-        <p14:creationId xmlns:p14="http://schemas.microsoft.com/office/powerpoint/2010/main" val="3806514972"/>
-      </p:ext>
-    </p:extLst>
-  </p:cSld>
-  <p:clrMapOvr>
-    <a:masterClrMapping/>
-  </p:clrMapOvr>
-</p:sld>
-</file>
-
 <file path=ppt/slides/slide2.xml><?xml version="1.0" encoding="utf-8"?>
 <p:sld xmlns:a="http://schemas.openxmlformats.org/drawingml/2006/main" xmlns:r="http://schemas.openxmlformats.org/officeDocument/2006/relationships" xmlns:p="http://schemas.openxmlformats.org/presentationml/2006/main">
   <p:cSld>
@@ -4333,6 +4431,260 @@
       </p:par>
     </p:tnLst>
   </p:timing>
+</p:sld>
+</file>
+
+<file path=ppt/slides/slide20.xml><?xml version="1.0" encoding="utf-8"?>
+<p:sld xmlns:a="http://schemas.openxmlformats.org/drawingml/2006/main" xmlns:r="http://schemas.openxmlformats.org/officeDocument/2006/relationships" xmlns:p="http://schemas.openxmlformats.org/presentationml/2006/main">
+  <p:cSld>
+    <p:spTree>
+      <p:nvGrpSpPr>
+        <p:cNvPr id="1" name=""/>
+        <p:cNvGrpSpPr/>
+        <p:nvPr/>
+      </p:nvGrpSpPr>
+      <p:grpSpPr>
+        <a:xfrm>
+          <a:off x="0" y="0"/>
+          <a:ext cx="0" cy="0"/>
+          <a:chOff x="0" y="0"/>
+          <a:chExt cx="0" cy="0"/>
+        </a:xfrm>
+      </p:grpSpPr>
+      <p:sp>
+        <p:nvSpPr>
+          <p:cNvPr id="2" name="Title 1"/>
+          <p:cNvSpPr>
+            <a:spLocks noGrp="1"/>
+          </p:cNvSpPr>
+          <p:nvPr>
+            <p:ph type="title"/>
+          </p:nvPr>
+        </p:nvSpPr>
+        <p:spPr/>
+        <p:txBody>
+          <a:bodyPr/>
+          <a:lstStyle/>
+          <a:p>
+            <a:r>
+              <a:rPr lang="en-US" dirty="0" smtClean="0"/>
+              <a:t>WHILE LOOP</a:t>
+            </a:r>
+            <a:endParaRPr lang="en-US" dirty="0"/>
+          </a:p>
+        </p:txBody>
+      </p:sp>
+      <p:pic>
+        <p:nvPicPr>
+          <p:cNvPr id="4" name="Content Placeholder 3"/>
+          <p:cNvPicPr>
+            <a:picLocks noGrp="1" noChangeAspect="1"/>
+          </p:cNvPicPr>
+          <p:nvPr>
+            <p:ph idx="1"/>
+          </p:nvPr>
+        </p:nvPicPr>
+        <p:blipFill>
+          <a:blip r:embed="rId2">
+            <a:extLst>
+              <a:ext uri="{28A0092B-C50C-407E-A947-70E740481C1C}">
+                <a14:useLocalDpi xmlns:a14="http://schemas.microsoft.com/office/drawing/2010/main" val="0"/>
+              </a:ext>
+            </a:extLst>
+          </a:blip>
+          <a:stretch>
+            <a:fillRect/>
+          </a:stretch>
+        </p:blipFill>
+        <p:spPr>
+          <a:xfrm>
+            <a:off x="2231136" y="2518109"/>
+            <a:ext cx="2557432" cy="3928527"/>
+          </a:xfrm>
+        </p:spPr>
+      </p:pic>
+    </p:spTree>
+    <p:extLst>
+      <p:ext uri="{BB962C8B-B14F-4D97-AF65-F5344CB8AC3E}">
+        <p14:creationId xmlns:p14="http://schemas.microsoft.com/office/powerpoint/2010/main" val="717972051"/>
+      </p:ext>
+    </p:extLst>
+  </p:cSld>
+  <p:clrMapOvr>
+    <a:masterClrMapping/>
+  </p:clrMapOvr>
+</p:sld>
+</file>
+
+<file path=ppt/slides/slide21.xml><?xml version="1.0" encoding="utf-8"?>
+<p:sld xmlns:a="http://schemas.openxmlformats.org/drawingml/2006/main" xmlns:r="http://schemas.openxmlformats.org/officeDocument/2006/relationships" xmlns:p="http://schemas.openxmlformats.org/presentationml/2006/main">
+  <p:cSld>
+    <p:spTree>
+      <p:nvGrpSpPr>
+        <p:cNvPr id="1" name=""/>
+        <p:cNvGrpSpPr/>
+        <p:nvPr/>
+      </p:nvGrpSpPr>
+      <p:grpSpPr>
+        <a:xfrm>
+          <a:off x="0" y="0"/>
+          <a:ext cx="0" cy="0"/>
+          <a:chOff x="0" y="0"/>
+          <a:chExt cx="0" cy="0"/>
+        </a:xfrm>
+      </p:grpSpPr>
+      <p:sp>
+        <p:nvSpPr>
+          <p:cNvPr id="2" name="Title 1"/>
+          <p:cNvSpPr>
+            <a:spLocks noGrp="1"/>
+          </p:cNvSpPr>
+          <p:nvPr>
+            <p:ph type="title"/>
+          </p:nvPr>
+        </p:nvSpPr>
+        <p:spPr/>
+        <p:txBody>
+          <a:bodyPr/>
+          <a:lstStyle/>
+          <a:p>
+            <a:r>
+              <a:rPr lang="en-US" dirty="0" smtClean="0"/>
+              <a:t>DO - WHILE</a:t>
+            </a:r>
+            <a:endParaRPr lang="en-US" dirty="0"/>
+          </a:p>
+        </p:txBody>
+      </p:sp>
+      <p:pic>
+        <p:nvPicPr>
+          <p:cNvPr id="4" name="Content Placeholder 3"/>
+          <p:cNvPicPr>
+            <a:picLocks noGrp="1" noChangeAspect="1"/>
+          </p:cNvPicPr>
+          <p:nvPr>
+            <p:ph idx="1"/>
+          </p:nvPr>
+        </p:nvPicPr>
+        <p:blipFill>
+          <a:blip r:embed="rId2">
+            <a:extLst>
+              <a:ext uri="{28A0092B-C50C-407E-A947-70E740481C1C}">
+                <a14:useLocalDpi xmlns:a14="http://schemas.microsoft.com/office/drawing/2010/main" val="0"/>
+              </a:ext>
+            </a:extLst>
+          </a:blip>
+          <a:stretch>
+            <a:fillRect/>
+          </a:stretch>
+        </p:blipFill>
+        <p:spPr>
+          <a:xfrm>
+            <a:off x="2231135" y="2457951"/>
+            <a:ext cx="3088161" cy="3690186"/>
+          </a:xfrm>
+        </p:spPr>
+      </p:pic>
+    </p:spTree>
+    <p:extLst>
+      <p:ext uri="{BB962C8B-B14F-4D97-AF65-F5344CB8AC3E}">
+        <p14:creationId xmlns:p14="http://schemas.microsoft.com/office/powerpoint/2010/main" val="4191372912"/>
+      </p:ext>
+    </p:extLst>
+  </p:cSld>
+  <p:clrMapOvr>
+    <a:masterClrMapping/>
+  </p:clrMapOvr>
+</p:sld>
+</file>
+
+<file path=ppt/slides/slide22.xml><?xml version="1.0" encoding="utf-8"?>
+<p:sld xmlns:a="http://schemas.openxmlformats.org/drawingml/2006/main" xmlns:r="http://schemas.openxmlformats.org/officeDocument/2006/relationships" xmlns:p="http://schemas.openxmlformats.org/presentationml/2006/main">
+  <p:cSld>
+    <p:spTree>
+      <p:nvGrpSpPr>
+        <p:cNvPr id="1" name=""/>
+        <p:cNvGrpSpPr/>
+        <p:nvPr/>
+      </p:nvGrpSpPr>
+      <p:grpSpPr>
+        <a:xfrm>
+          <a:off x="0" y="0"/>
+          <a:ext cx="0" cy="0"/>
+          <a:chOff x="0" y="0"/>
+          <a:chExt cx="0" cy="0"/>
+        </a:xfrm>
+      </p:grpSpPr>
+      <p:sp>
+        <p:nvSpPr>
+          <p:cNvPr id="2" name="Title 1"/>
+          <p:cNvSpPr>
+            <a:spLocks noGrp="1"/>
+          </p:cNvSpPr>
+          <p:nvPr>
+            <p:ph type="title"/>
+          </p:nvPr>
+        </p:nvSpPr>
+        <p:spPr/>
+        <p:txBody>
+          <a:bodyPr/>
+          <a:lstStyle/>
+          <a:p>
+            <a:r>
+              <a:rPr lang="en-US" dirty="0" smtClean="0"/>
+              <a:t>WHILE </a:t>
+            </a:r>
+            <a:r>
+              <a:rPr lang="en-US" dirty="0" err="1" smtClean="0"/>
+              <a:t>vs</a:t>
+            </a:r>
+            <a:r>
+              <a:rPr lang="en-US" dirty="0" smtClean="0"/>
+              <a:t> Do-while</a:t>
+            </a:r>
+            <a:endParaRPr lang="en-US" dirty="0"/>
+          </a:p>
+        </p:txBody>
+      </p:sp>
+      <p:pic>
+        <p:nvPicPr>
+          <p:cNvPr id="4" name="Content Placeholder 3"/>
+          <p:cNvPicPr>
+            <a:picLocks noGrp="1" noChangeAspect="1"/>
+          </p:cNvPicPr>
+          <p:nvPr>
+            <p:ph idx="1"/>
+          </p:nvPr>
+        </p:nvPicPr>
+        <p:blipFill>
+          <a:blip r:embed="rId2">
+            <a:extLst>
+              <a:ext uri="{28A0092B-C50C-407E-A947-70E740481C1C}">
+                <a14:useLocalDpi xmlns:a14="http://schemas.microsoft.com/office/drawing/2010/main" val="0"/>
+              </a:ext>
+            </a:extLst>
+          </a:blip>
+          <a:stretch>
+            <a:fillRect/>
+          </a:stretch>
+        </p:blipFill>
+        <p:spPr>
+          <a:xfrm>
+            <a:off x="3351203" y="2469983"/>
+            <a:ext cx="5489594" cy="4100041"/>
+          </a:xfrm>
+        </p:spPr>
+      </p:pic>
+    </p:spTree>
+    <p:extLst>
+      <p:ext uri="{BB962C8B-B14F-4D97-AF65-F5344CB8AC3E}">
+        <p14:creationId xmlns:p14="http://schemas.microsoft.com/office/powerpoint/2010/main" val="3806514972"/>
+      </p:ext>
+    </p:extLst>
+  </p:cSld>
+  <p:clrMapOvr>
+    <a:masterClrMapping/>
+  </p:clrMapOvr>
 </p:sld>
 </file>
 
@@ -4542,6 +4894,433 @@
           <a:p>
             <a:r>
               <a:rPr lang="en-US" dirty="0" smtClean="0"/>
+              <a:t>DEFINDING </a:t>
+            </a:r>
+            <a:r>
+              <a:rPr lang="en-US" dirty="0" err="1" smtClean="0"/>
+              <a:t>VARIable</a:t>
+            </a:r>
+            <a:endParaRPr lang="en-US" dirty="0"/>
+          </a:p>
+        </p:txBody>
+      </p:sp>
+      <p:pic>
+        <p:nvPicPr>
+          <p:cNvPr id="4" name="Content Placeholder 3"/>
+          <p:cNvPicPr>
+            <a:picLocks noGrp="1" noChangeAspect="1"/>
+          </p:cNvPicPr>
+          <p:nvPr>
+            <p:ph idx="1"/>
+          </p:nvPr>
+        </p:nvPicPr>
+        <p:blipFill>
+          <a:blip r:embed="rId2">
+            <a:extLst>
+              <a:ext uri="{28A0092B-C50C-407E-A947-70E740481C1C}">
+                <a14:useLocalDpi xmlns:a14="http://schemas.microsoft.com/office/drawing/2010/main" val="0"/>
+              </a:ext>
+            </a:extLst>
+          </a:blip>
+          <a:stretch>
+            <a:fillRect/>
+          </a:stretch>
+        </p:blipFill>
+        <p:spPr>
+          <a:xfrm>
+            <a:off x="2231136" y="2450399"/>
+            <a:ext cx="7731125" cy="2587690"/>
+          </a:xfrm>
+        </p:spPr>
+      </p:pic>
+      <p:sp>
+        <p:nvSpPr>
+          <p:cNvPr id="5" name="TextBox 4"/>
+          <p:cNvSpPr txBox="1"/>
+          <p:nvPr/>
+        </p:nvSpPr>
+        <p:spPr>
+          <a:xfrm>
+            <a:off x="2231136" y="5281863"/>
+            <a:ext cx="7729728" cy="923330"/>
+          </a:xfrm>
+          <a:prstGeom prst="rect">
+            <a:avLst/>
+          </a:prstGeom>
+          <a:noFill/>
+        </p:spPr>
+        <p:txBody>
+          <a:bodyPr wrap="square" rtlCol="0">
+            <a:spAutoFit/>
+          </a:bodyPr>
+          <a:lstStyle/>
+          <a:p>
+            <a:pPr marL="342900" indent="-342900">
+              <a:buAutoNum type="arabicPeriod"/>
+            </a:pPr>
+            <a:r>
+              <a:rPr lang="en-US" dirty="0" err="1" smtClean="0"/>
+              <a:t>Khai</a:t>
+            </a:r>
+            <a:r>
+              <a:rPr lang="en-US" dirty="0" smtClean="0"/>
+              <a:t> </a:t>
+            </a:r>
+            <a:r>
+              <a:rPr lang="en-US" dirty="0" err="1" smtClean="0"/>
+              <a:t>báo</a:t>
+            </a:r>
+            <a:endParaRPr lang="en-US" dirty="0" smtClean="0"/>
+          </a:p>
+          <a:p>
+            <a:pPr marL="342900" indent="-342900">
+              <a:buAutoNum type="arabicPeriod"/>
+            </a:pPr>
+            <a:r>
+              <a:rPr lang="en-US" dirty="0" err="1" smtClean="0"/>
+              <a:t>Khởi</a:t>
+            </a:r>
+            <a:r>
+              <a:rPr lang="en-US" dirty="0" smtClean="0"/>
+              <a:t> </a:t>
+            </a:r>
+            <a:r>
+              <a:rPr lang="en-US" dirty="0" err="1" smtClean="0"/>
+              <a:t>tạo</a:t>
+            </a:r>
+            <a:endParaRPr lang="en-US" dirty="0" smtClean="0"/>
+          </a:p>
+          <a:p>
+            <a:pPr marL="342900" indent="-342900">
+              <a:buAutoNum type="arabicPeriod"/>
+            </a:pPr>
+            <a:r>
+              <a:rPr lang="en-US" dirty="0" err="1" smtClean="0"/>
+              <a:t>Sử</a:t>
+            </a:r>
+            <a:r>
+              <a:rPr lang="en-US" dirty="0" smtClean="0"/>
+              <a:t> </a:t>
+            </a:r>
+            <a:r>
+              <a:rPr lang="en-US" dirty="0" err="1" smtClean="0"/>
+              <a:t>dụng</a:t>
+            </a:r>
+            <a:endParaRPr lang="en-US" dirty="0"/>
+          </a:p>
+        </p:txBody>
+      </p:sp>
+    </p:spTree>
+    <p:extLst>
+      <p:ext uri="{BB962C8B-B14F-4D97-AF65-F5344CB8AC3E}">
+        <p14:creationId xmlns:p14="http://schemas.microsoft.com/office/powerpoint/2010/main" val="2482066472"/>
+      </p:ext>
+    </p:extLst>
+  </p:cSld>
+  <p:clrMapOvr>
+    <a:masterClrMapping/>
+  </p:clrMapOvr>
+</p:sld>
+</file>
+
+<file path=ppt/slides/slide6.xml><?xml version="1.0" encoding="utf-8"?>
+<p:sld xmlns:a="http://schemas.openxmlformats.org/drawingml/2006/main" xmlns:r="http://schemas.openxmlformats.org/officeDocument/2006/relationships" xmlns:p="http://schemas.openxmlformats.org/presentationml/2006/main">
+  <p:cSld>
+    <p:spTree>
+      <p:nvGrpSpPr>
+        <p:cNvPr id="1" name=""/>
+        <p:cNvGrpSpPr/>
+        <p:nvPr/>
+      </p:nvGrpSpPr>
+      <p:grpSpPr>
+        <a:xfrm>
+          <a:off x="0" y="0"/>
+          <a:ext cx="0" cy="0"/>
+          <a:chOff x="0" y="0"/>
+          <a:chExt cx="0" cy="0"/>
+        </a:xfrm>
+      </p:grpSpPr>
+      <p:sp>
+        <p:nvSpPr>
+          <p:cNvPr id="2" name="Title 1"/>
+          <p:cNvSpPr>
+            <a:spLocks noGrp="1"/>
+          </p:cNvSpPr>
+          <p:nvPr>
+            <p:ph type="title"/>
+          </p:nvPr>
+        </p:nvSpPr>
+        <p:spPr/>
+        <p:txBody>
+          <a:bodyPr/>
+          <a:lstStyle/>
+          <a:p>
+            <a:r>
+              <a:rPr lang="en-US" dirty="0"/>
+              <a:t>naming </a:t>
+            </a:r>
+            <a:r>
+              <a:rPr lang="en-US" dirty="0" smtClean="0"/>
+              <a:t>conventions</a:t>
+            </a:r>
+            <a:endParaRPr lang="en-US" dirty="0"/>
+          </a:p>
+        </p:txBody>
+      </p:sp>
+      <p:sp>
+        <p:nvSpPr>
+          <p:cNvPr id="3" name="Content Placeholder 2"/>
+          <p:cNvSpPr>
+            <a:spLocks noGrp="1"/>
+          </p:cNvSpPr>
+          <p:nvPr>
+            <p:ph idx="1"/>
+          </p:nvPr>
+        </p:nvSpPr>
+        <p:spPr/>
+        <p:txBody>
+          <a:bodyPr/>
+          <a:lstStyle/>
+          <a:p>
+            <a:r>
+              <a:rPr lang="vi-VN" dirty="0"/>
+              <a:t>Tên biến là một chuỗi ký tự liên kết (không có khoảng trắng) và không chứa ký tự đặc biệt. </a:t>
+            </a:r>
+          </a:p>
+          <a:p>
+            <a:r>
+              <a:rPr lang="vi-VN" dirty="0"/>
+              <a:t>Tên biến không được đặt bằng tiếng việt có dấu. </a:t>
+            </a:r>
+          </a:p>
+          <a:p>
+            <a:r>
+              <a:rPr lang="vi-VN" dirty="0"/>
+              <a:t>Tên không được bắt đầu bằng số. </a:t>
+            </a:r>
+          </a:p>
+          <a:p>
+            <a:r>
+              <a:rPr lang="vi-VN" dirty="0"/>
+              <a:t>Tên biến không được trùng nhau. </a:t>
+            </a:r>
+          </a:p>
+          <a:p>
+            <a:r>
+              <a:rPr lang="vi-VN" dirty="0"/>
+              <a:t>Tên biến không được trùng với từ khóa: </a:t>
+            </a:r>
+          </a:p>
+          <a:p>
+            <a:endParaRPr lang="en-US" dirty="0"/>
+          </a:p>
+        </p:txBody>
+      </p:sp>
+    </p:spTree>
+    <p:extLst>
+      <p:ext uri="{BB962C8B-B14F-4D97-AF65-F5344CB8AC3E}">
+        <p14:creationId xmlns:p14="http://schemas.microsoft.com/office/powerpoint/2010/main" val="2218817513"/>
+      </p:ext>
+    </p:extLst>
+  </p:cSld>
+  <p:clrMapOvr>
+    <a:masterClrMapping/>
+  </p:clrMapOvr>
+</p:sld>
+</file>
+
+<file path=ppt/slides/slide7.xml><?xml version="1.0" encoding="utf-8"?>
+<p:sld xmlns:a="http://schemas.openxmlformats.org/drawingml/2006/main" xmlns:r="http://schemas.openxmlformats.org/officeDocument/2006/relationships" xmlns:p="http://schemas.openxmlformats.org/presentationml/2006/main">
+  <p:cSld>
+    <p:spTree>
+      <p:nvGrpSpPr>
+        <p:cNvPr id="1" name=""/>
+        <p:cNvGrpSpPr/>
+        <p:nvPr/>
+      </p:nvGrpSpPr>
+      <p:grpSpPr>
+        <a:xfrm>
+          <a:off x="0" y="0"/>
+          <a:ext cx="0" cy="0"/>
+          <a:chOff x="0" y="0"/>
+          <a:chExt cx="0" cy="0"/>
+        </a:xfrm>
+      </p:grpSpPr>
+      <p:sp>
+        <p:nvSpPr>
+          <p:cNvPr id="2" name="Title 1"/>
+          <p:cNvSpPr>
+            <a:spLocks noGrp="1"/>
+          </p:cNvSpPr>
+          <p:nvPr>
+            <p:ph type="title"/>
+          </p:nvPr>
+        </p:nvSpPr>
+        <p:spPr/>
+        <p:txBody>
+          <a:bodyPr/>
+          <a:lstStyle/>
+          <a:p>
+            <a:r>
+              <a:rPr lang="en-US" dirty="0"/>
+              <a:t>naming conventions</a:t>
+            </a:r>
+          </a:p>
+        </p:txBody>
+      </p:sp>
+      <p:pic>
+        <p:nvPicPr>
+          <p:cNvPr id="9" name="Content Placeholder 8"/>
+          <p:cNvPicPr>
+            <a:picLocks noGrp="1" noChangeAspect="1"/>
+          </p:cNvPicPr>
+          <p:nvPr>
+            <p:ph idx="1"/>
+          </p:nvPr>
+        </p:nvPicPr>
+        <p:blipFill>
+          <a:blip r:embed="rId2"/>
+          <a:stretch>
+            <a:fillRect/>
+          </a:stretch>
+        </p:blipFill>
+        <p:spPr>
+          <a:xfrm>
+            <a:off x="2230438" y="2957264"/>
+            <a:ext cx="7731125" cy="2464296"/>
+          </a:xfrm>
+          <a:prstGeom prst="rect">
+            <a:avLst/>
+          </a:prstGeom>
+        </p:spPr>
+      </p:pic>
+    </p:spTree>
+    <p:extLst>
+      <p:ext uri="{BB962C8B-B14F-4D97-AF65-F5344CB8AC3E}">
+        <p14:creationId xmlns:p14="http://schemas.microsoft.com/office/powerpoint/2010/main" val="2808647099"/>
+      </p:ext>
+    </p:extLst>
+  </p:cSld>
+  <p:clrMapOvr>
+    <a:masterClrMapping/>
+  </p:clrMapOvr>
+</p:sld>
+</file>
+
+<file path=ppt/slides/slide8.xml><?xml version="1.0" encoding="utf-8"?>
+<p:sld xmlns:a="http://schemas.openxmlformats.org/drawingml/2006/main" xmlns:r="http://schemas.openxmlformats.org/officeDocument/2006/relationships" xmlns:p="http://schemas.openxmlformats.org/presentationml/2006/main">
+  <p:cSld>
+    <p:spTree>
+      <p:nvGrpSpPr>
+        <p:cNvPr id="1" name=""/>
+        <p:cNvGrpSpPr/>
+        <p:nvPr/>
+      </p:nvGrpSpPr>
+      <p:grpSpPr>
+        <a:xfrm>
+          <a:off x="0" y="0"/>
+          <a:ext cx="0" cy="0"/>
+          <a:chOff x="0" y="0"/>
+          <a:chExt cx="0" cy="0"/>
+        </a:xfrm>
+      </p:grpSpPr>
+      <p:sp>
+        <p:nvSpPr>
+          <p:cNvPr id="2" name="Title 1"/>
+          <p:cNvSpPr>
+            <a:spLocks noGrp="1"/>
+          </p:cNvSpPr>
+          <p:nvPr>
+            <p:ph type="title"/>
+          </p:nvPr>
+        </p:nvSpPr>
+        <p:spPr/>
+        <p:txBody>
+          <a:bodyPr/>
+          <a:lstStyle/>
+          <a:p>
+            <a:r>
+              <a:rPr lang="en-US" dirty="0"/>
+              <a:t>naming conventions</a:t>
+            </a:r>
+          </a:p>
+        </p:txBody>
+      </p:sp>
+      <p:pic>
+        <p:nvPicPr>
+          <p:cNvPr id="6" name="Content Placeholder 5"/>
+          <p:cNvPicPr>
+            <a:picLocks noGrp="1" noChangeAspect="1"/>
+          </p:cNvPicPr>
+          <p:nvPr>
+            <p:ph idx="1"/>
+          </p:nvPr>
+        </p:nvPicPr>
+        <p:blipFill rotWithShape="1">
+          <a:blip r:embed="rId2">
+            <a:extLst>
+              <a:ext uri="{28A0092B-C50C-407E-A947-70E740481C1C}">
+                <a14:useLocalDpi xmlns:a14="http://schemas.microsoft.com/office/drawing/2010/main" val="0"/>
+              </a:ext>
+            </a:extLst>
+          </a:blip>
+          <a:srcRect t="20444" b="20212"/>
+          <a:stretch/>
+        </p:blipFill>
+        <p:spPr>
+          <a:xfrm>
+            <a:off x="2231136" y="2725497"/>
+            <a:ext cx="7716987" cy="3434672"/>
+          </a:xfrm>
+        </p:spPr>
+      </p:pic>
+    </p:spTree>
+    <p:extLst>
+      <p:ext uri="{BB962C8B-B14F-4D97-AF65-F5344CB8AC3E}">
+        <p14:creationId xmlns:p14="http://schemas.microsoft.com/office/powerpoint/2010/main" val="2893345146"/>
+      </p:ext>
+    </p:extLst>
+  </p:cSld>
+  <p:clrMapOvr>
+    <a:masterClrMapping/>
+  </p:clrMapOvr>
+</p:sld>
+</file>
+
+<file path=ppt/slides/slide9.xml><?xml version="1.0" encoding="utf-8"?>
+<p:sld xmlns:a="http://schemas.openxmlformats.org/drawingml/2006/main" xmlns:r="http://schemas.openxmlformats.org/officeDocument/2006/relationships" xmlns:p="http://schemas.openxmlformats.org/presentationml/2006/main">
+  <p:cSld>
+    <p:spTree>
+      <p:nvGrpSpPr>
+        <p:cNvPr id="1" name=""/>
+        <p:cNvGrpSpPr/>
+        <p:nvPr/>
+      </p:nvGrpSpPr>
+      <p:grpSpPr>
+        <a:xfrm>
+          <a:off x="0" y="0"/>
+          <a:ext cx="0" cy="0"/>
+          <a:chOff x="0" y="0"/>
+          <a:chExt cx="0" cy="0"/>
+        </a:xfrm>
+      </p:grpSpPr>
+      <p:sp>
+        <p:nvSpPr>
+          <p:cNvPr id="2" name="Title 1"/>
+          <p:cNvSpPr>
+            <a:spLocks noGrp="1"/>
+          </p:cNvSpPr>
+          <p:nvPr>
+            <p:ph type="title"/>
+          </p:nvPr>
+        </p:nvSpPr>
+        <p:spPr/>
+        <p:txBody>
+          <a:bodyPr/>
+          <a:lstStyle/>
+          <a:p>
+            <a:r>
+              <a:rPr lang="en-US" dirty="0" smtClean="0"/>
               <a:t>SCOPE</a:t>
             </a:r>
             <a:endParaRPr lang="en-US" dirty="0"/>
@@ -4578,354 +5357,6 @@
     <p:extLst>
       <p:ext uri="{BB962C8B-B14F-4D97-AF65-F5344CB8AC3E}">
         <p14:creationId xmlns:p14="http://schemas.microsoft.com/office/powerpoint/2010/main" val="2042515304"/>
-      </p:ext>
-    </p:extLst>
-  </p:cSld>
-  <p:clrMapOvr>
-    <a:masterClrMapping/>
-  </p:clrMapOvr>
-  <p:timing>
-    <p:tnLst>
-      <p:par>
-        <p:cTn id="1" dur="indefinite" restart="never" nodeType="tmRoot"/>
-      </p:par>
-    </p:tnLst>
-  </p:timing>
-</p:sld>
-</file>
-
-<file path=ppt/slides/slide6.xml><?xml version="1.0" encoding="utf-8"?>
-<p:sld xmlns:a="http://schemas.openxmlformats.org/drawingml/2006/main" xmlns:r="http://schemas.openxmlformats.org/officeDocument/2006/relationships" xmlns:p="http://schemas.openxmlformats.org/presentationml/2006/main">
-  <p:cSld>
-    <p:spTree>
-      <p:nvGrpSpPr>
-        <p:cNvPr id="1" name=""/>
-        <p:cNvGrpSpPr/>
-        <p:nvPr/>
-      </p:nvGrpSpPr>
-      <p:grpSpPr>
-        <a:xfrm>
-          <a:off x="0" y="0"/>
-          <a:ext cx="0" cy="0"/>
-          <a:chOff x="0" y="0"/>
-          <a:chExt cx="0" cy="0"/>
-        </a:xfrm>
-      </p:grpSpPr>
-      <p:sp>
-        <p:nvSpPr>
-          <p:cNvPr id="2" name="Title 1"/>
-          <p:cNvSpPr>
-            <a:spLocks noGrp="1"/>
-          </p:cNvSpPr>
-          <p:nvPr>
-            <p:ph type="title"/>
-          </p:nvPr>
-        </p:nvSpPr>
-        <p:spPr/>
-        <p:txBody>
-          <a:bodyPr/>
-          <a:lstStyle/>
-          <a:p>
-            <a:r>
-              <a:rPr lang="en-US" dirty="0"/>
-              <a:t>ARITHEMIC </a:t>
-            </a:r>
-            <a:r>
-              <a:rPr lang="en-US" dirty="0" smtClean="0"/>
-              <a:t>Operators</a:t>
-            </a:r>
-            <a:endParaRPr lang="en-US" dirty="0"/>
-          </a:p>
-        </p:txBody>
-      </p:sp>
-      <p:pic>
-        <p:nvPicPr>
-          <p:cNvPr id="4" name="Content Placeholder 3"/>
-          <p:cNvPicPr>
-            <a:picLocks noGrp="1" noChangeAspect="1"/>
-          </p:cNvPicPr>
-          <p:nvPr>
-            <p:ph idx="1"/>
-          </p:nvPr>
-        </p:nvPicPr>
-        <p:blipFill>
-          <a:blip r:embed="rId2"/>
-          <a:stretch>
-            <a:fillRect/>
-          </a:stretch>
-        </p:blipFill>
-        <p:spPr>
-          <a:xfrm>
-            <a:off x="2231136" y="2505437"/>
-            <a:ext cx="7725186" cy="3365974"/>
-          </a:xfrm>
-          <a:prstGeom prst="rect">
-            <a:avLst/>
-          </a:prstGeom>
-        </p:spPr>
-      </p:pic>
-    </p:spTree>
-    <p:extLst>
-      <p:ext uri="{BB962C8B-B14F-4D97-AF65-F5344CB8AC3E}">
-        <p14:creationId xmlns:p14="http://schemas.microsoft.com/office/powerpoint/2010/main" val="880077068"/>
-      </p:ext>
-    </p:extLst>
-  </p:cSld>
-  <p:clrMapOvr>
-    <a:masterClrMapping/>
-  </p:clrMapOvr>
-  <p:timing>
-    <p:tnLst>
-      <p:par>
-        <p:cTn id="1" dur="indefinite" restart="never" nodeType="tmRoot"/>
-      </p:par>
-    </p:tnLst>
-  </p:timing>
-</p:sld>
-</file>
-
-<file path=ppt/slides/slide7.xml><?xml version="1.0" encoding="utf-8"?>
-<p:sld xmlns:a="http://schemas.openxmlformats.org/drawingml/2006/main" xmlns:r="http://schemas.openxmlformats.org/officeDocument/2006/relationships" xmlns:p="http://schemas.openxmlformats.org/presentationml/2006/main">
-  <p:cSld>
-    <p:spTree>
-      <p:nvGrpSpPr>
-        <p:cNvPr id="1" name=""/>
-        <p:cNvGrpSpPr/>
-        <p:nvPr/>
-      </p:nvGrpSpPr>
-      <p:grpSpPr>
-        <a:xfrm>
-          <a:off x="0" y="0"/>
-          <a:ext cx="0" cy="0"/>
-          <a:chOff x="0" y="0"/>
-          <a:chExt cx="0" cy="0"/>
-        </a:xfrm>
-      </p:grpSpPr>
-      <p:sp>
-        <p:nvSpPr>
-          <p:cNvPr id="2" name="Title 1"/>
-          <p:cNvSpPr>
-            <a:spLocks noGrp="1"/>
-          </p:cNvSpPr>
-          <p:nvPr>
-            <p:ph type="title"/>
-          </p:nvPr>
-        </p:nvSpPr>
-        <p:spPr/>
-        <p:txBody>
-          <a:bodyPr/>
-          <a:lstStyle/>
-          <a:p>
-            <a:r>
-              <a:rPr lang="en-US" dirty="0" smtClean="0"/>
-              <a:t>ARITHEMIC Operators</a:t>
-            </a:r>
-            <a:endParaRPr lang="en-US" dirty="0"/>
-          </a:p>
-        </p:txBody>
-      </p:sp>
-      <p:pic>
-        <p:nvPicPr>
-          <p:cNvPr id="4" name="Content Placeholder 3"/>
-          <p:cNvPicPr>
-            <a:picLocks noGrp="1" noChangeAspect="1"/>
-          </p:cNvPicPr>
-          <p:nvPr>
-            <p:ph idx="1"/>
-          </p:nvPr>
-        </p:nvPicPr>
-        <p:blipFill>
-          <a:blip r:embed="rId2"/>
-          <a:stretch>
-            <a:fillRect/>
-          </a:stretch>
-        </p:blipFill>
-        <p:spPr>
-          <a:xfrm>
-            <a:off x="2230438" y="3110834"/>
-            <a:ext cx="7731125" cy="2157156"/>
-          </a:xfrm>
-          <a:prstGeom prst="rect">
-            <a:avLst/>
-          </a:prstGeom>
-        </p:spPr>
-      </p:pic>
-    </p:spTree>
-    <p:extLst>
-      <p:ext uri="{BB962C8B-B14F-4D97-AF65-F5344CB8AC3E}">
-        <p14:creationId xmlns:p14="http://schemas.microsoft.com/office/powerpoint/2010/main" val="3317089973"/>
-      </p:ext>
-    </p:extLst>
-  </p:cSld>
-  <p:clrMapOvr>
-    <a:masterClrMapping/>
-  </p:clrMapOvr>
-  <p:timing>
-    <p:tnLst>
-      <p:par>
-        <p:cTn id="1" dur="indefinite" restart="never" nodeType="tmRoot"/>
-      </p:par>
-    </p:tnLst>
-  </p:timing>
-</p:sld>
-</file>
-
-<file path=ppt/slides/slide8.xml><?xml version="1.0" encoding="utf-8"?>
-<p:sld xmlns:a="http://schemas.openxmlformats.org/drawingml/2006/main" xmlns:r="http://schemas.openxmlformats.org/officeDocument/2006/relationships" xmlns:p="http://schemas.openxmlformats.org/presentationml/2006/main">
-  <p:cSld>
-    <p:spTree>
-      <p:nvGrpSpPr>
-        <p:cNvPr id="1" name=""/>
-        <p:cNvGrpSpPr/>
-        <p:nvPr/>
-      </p:nvGrpSpPr>
-      <p:grpSpPr>
-        <a:xfrm>
-          <a:off x="0" y="0"/>
-          <a:ext cx="0" cy="0"/>
-          <a:chOff x="0" y="0"/>
-          <a:chExt cx="0" cy="0"/>
-        </a:xfrm>
-      </p:grpSpPr>
-      <p:sp>
-        <p:nvSpPr>
-          <p:cNvPr id="2" name="Title 1"/>
-          <p:cNvSpPr>
-            <a:spLocks noGrp="1"/>
-          </p:cNvSpPr>
-          <p:nvPr>
-            <p:ph type="title"/>
-          </p:nvPr>
-        </p:nvSpPr>
-        <p:spPr/>
-        <p:txBody>
-          <a:bodyPr/>
-          <a:lstStyle/>
-          <a:p>
-            <a:r>
-              <a:rPr lang="en-US" dirty="0" smtClean="0"/>
-              <a:t>COMPARISON OPERATORS</a:t>
-            </a:r>
-            <a:endParaRPr lang="en-US" dirty="0"/>
-          </a:p>
-        </p:txBody>
-      </p:sp>
-      <p:pic>
-        <p:nvPicPr>
-          <p:cNvPr id="4" name="Content Placeholder 3"/>
-          <p:cNvPicPr>
-            <a:picLocks noGrp="1" noChangeAspect="1"/>
-          </p:cNvPicPr>
-          <p:nvPr>
-            <p:ph idx="1"/>
-          </p:nvPr>
-        </p:nvPicPr>
-        <p:blipFill>
-          <a:blip r:embed="rId2"/>
-          <a:stretch>
-            <a:fillRect/>
-          </a:stretch>
-        </p:blipFill>
-        <p:spPr>
-          <a:xfrm>
-            <a:off x="2231136" y="2638425"/>
-            <a:ext cx="7724427" cy="3353301"/>
-          </a:xfrm>
-          <a:prstGeom prst="rect">
-            <a:avLst/>
-          </a:prstGeom>
-        </p:spPr>
-      </p:pic>
-    </p:spTree>
-    <p:extLst>
-      <p:ext uri="{BB962C8B-B14F-4D97-AF65-F5344CB8AC3E}">
-        <p14:creationId xmlns:p14="http://schemas.microsoft.com/office/powerpoint/2010/main" val="1449010644"/>
-      </p:ext>
-    </p:extLst>
-  </p:cSld>
-  <p:clrMapOvr>
-    <a:masterClrMapping/>
-  </p:clrMapOvr>
-  <p:timing>
-    <p:tnLst>
-      <p:par>
-        <p:cTn id="1" dur="indefinite" restart="never" nodeType="tmRoot"/>
-      </p:par>
-    </p:tnLst>
-  </p:timing>
-</p:sld>
-</file>
-
-<file path=ppt/slides/slide9.xml><?xml version="1.0" encoding="utf-8"?>
-<p:sld xmlns:a="http://schemas.openxmlformats.org/drawingml/2006/main" xmlns:r="http://schemas.openxmlformats.org/officeDocument/2006/relationships" xmlns:p="http://schemas.openxmlformats.org/presentationml/2006/main">
-  <p:cSld>
-    <p:spTree>
-      <p:nvGrpSpPr>
-        <p:cNvPr id="1" name=""/>
-        <p:cNvGrpSpPr/>
-        <p:nvPr/>
-      </p:nvGrpSpPr>
-      <p:grpSpPr>
-        <a:xfrm>
-          <a:off x="0" y="0"/>
-          <a:ext cx="0" cy="0"/>
-          <a:chOff x="0" y="0"/>
-          <a:chExt cx="0" cy="0"/>
-        </a:xfrm>
-      </p:grpSpPr>
-      <p:sp>
-        <p:nvSpPr>
-          <p:cNvPr id="2" name="Title 1"/>
-          <p:cNvSpPr>
-            <a:spLocks noGrp="1"/>
-          </p:cNvSpPr>
-          <p:nvPr>
-            <p:ph type="title"/>
-          </p:nvPr>
-        </p:nvSpPr>
-        <p:spPr/>
-        <p:txBody>
-          <a:bodyPr/>
-          <a:lstStyle/>
-          <a:p>
-            <a:r>
-              <a:rPr lang="en-US" dirty="0" smtClean="0"/>
-              <a:t>ASSIGNMENT OPERATORS</a:t>
-            </a:r>
-            <a:endParaRPr lang="en-US" dirty="0"/>
-          </a:p>
-        </p:txBody>
-      </p:sp>
-      <p:pic>
-        <p:nvPicPr>
-          <p:cNvPr id="6" name="Content Placeholder 5"/>
-          <p:cNvPicPr>
-            <a:picLocks noGrp="1" noChangeAspect="1"/>
-          </p:cNvPicPr>
-          <p:nvPr>
-            <p:ph idx="1"/>
-          </p:nvPr>
-        </p:nvPicPr>
-        <p:blipFill>
-          <a:blip r:embed="rId2"/>
-          <a:stretch>
-            <a:fillRect/>
-          </a:stretch>
-        </p:blipFill>
-        <p:spPr>
-          <a:xfrm>
-            <a:off x="2230438" y="2733418"/>
-            <a:ext cx="7731125" cy="2911988"/>
-          </a:xfrm>
-          <a:prstGeom prst="rect">
-            <a:avLst/>
-          </a:prstGeom>
-        </p:spPr>
-      </p:pic>
-    </p:spTree>
-    <p:extLst>
-      <p:ext uri="{BB962C8B-B14F-4D97-AF65-F5344CB8AC3E}">
-        <p14:creationId xmlns:p14="http://schemas.microsoft.com/office/powerpoint/2010/main" val="1793056558"/>
       </p:ext>
     </p:extLst>
   </p:cSld>

</xml_diff>